<commit_message>
draft notebook constraint part
</commit_message>
<xml_diff>
--- a/images.pptx
+++ b/images.pptx
@@ -12,6 +12,9 @@
     <p:sldId id="261" r:id="rId6"/>
     <p:sldId id="262" r:id="rId7"/>
     <p:sldId id="263" r:id="rId8"/>
+    <p:sldId id="264" r:id="rId9"/>
+    <p:sldId id="265" r:id="rId10"/>
+    <p:sldId id="266" r:id="rId11"/>
   </p:sldIdLst>
   <p:sldSz cx="12192000" cy="6858000"/>
   <p:notesSz cx="6858000" cy="9144000"/>
@@ -265,7 +268,7 @@
           <a:p>
             <a:fld id="{C9D7E1C7-362E-0A4F-BED6-EEFD53131585}" type="datetimeFigureOut">
               <a:rPr lang="en-US" smtClean="0"/>
-              <a:t>10/21/19</a:t>
+              <a:t>11/3/19</a:t>
             </a:fld>
             <a:endParaRPr lang="en-US"/>
           </a:p>
@@ -463,7 +466,7 @@
           <a:p>
             <a:fld id="{C9D7E1C7-362E-0A4F-BED6-EEFD53131585}" type="datetimeFigureOut">
               <a:rPr lang="en-US" smtClean="0"/>
-              <a:t>10/21/19</a:t>
+              <a:t>11/3/19</a:t>
             </a:fld>
             <a:endParaRPr lang="en-US"/>
           </a:p>
@@ -671,7 +674,7 @@
           <a:p>
             <a:fld id="{C9D7E1C7-362E-0A4F-BED6-EEFD53131585}" type="datetimeFigureOut">
               <a:rPr lang="en-US" smtClean="0"/>
-              <a:t>10/21/19</a:t>
+              <a:t>11/3/19</a:t>
             </a:fld>
             <a:endParaRPr lang="en-US"/>
           </a:p>
@@ -869,7 +872,7 @@
           <a:p>
             <a:fld id="{C9D7E1C7-362E-0A4F-BED6-EEFD53131585}" type="datetimeFigureOut">
               <a:rPr lang="en-US" smtClean="0"/>
-              <a:t>10/21/19</a:t>
+              <a:t>11/3/19</a:t>
             </a:fld>
             <a:endParaRPr lang="en-US"/>
           </a:p>
@@ -1144,7 +1147,7 @@
           <a:p>
             <a:fld id="{C9D7E1C7-362E-0A4F-BED6-EEFD53131585}" type="datetimeFigureOut">
               <a:rPr lang="en-US" smtClean="0"/>
-              <a:t>10/21/19</a:t>
+              <a:t>11/3/19</a:t>
             </a:fld>
             <a:endParaRPr lang="en-US"/>
           </a:p>
@@ -1409,7 +1412,7 @@
           <a:p>
             <a:fld id="{C9D7E1C7-362E-0A4F-BED6-EEFD53131585}" type="datetimeFigureOut">
               <a:rPr lang="en-US" smtClean="0"/>
-              <a:t>10/21/19</a:t>
+              <a:t>11/3/19</a:t>
             </a:fld>
             <a:endParaRPr lang="en-US"/>
           </a:p>
@@ -1821,7 +1824,7 @@
           <a:p>
             <a:fld id="{C9D7E1C7-362E-0A4F-BED6-EEFD53131585}" type="datetimeFigureOut">
               <a:rPr lang="en-US" smtClean="0"/>
-              <a:t>10/21/19</a:t>
+              <a:t>11/3/19</a:t>
             </a:fld>
             <a:endParaRPr lang="en-US"/>
           </a:p>
@@ -1962,7 +1965,7 @@
           <a:p>
             <a:fld id="{C9D7E1C7-362E-0A4F-BED6-EEFD53131585}" type="datetimeFigureOut">
               <a:rPr lang="en-US" smtClean="0"/>
-              <a:t>10/21/19</a:t>
+              <a:t>11/3/19</a:t>
             </a:fld>
             <a:endParaRPr lang="en-US"/>
           </a:p>
@@ -2075,7 +2078,7 @@
           <a:p>
             <a:fld id="{C9D7E1C7-362E-0A4F-BED6-EEFD53131585}" type="datetimeFigureOut">
               <a:rPr lang="en-US" smtClean="0"/>
-              <a:t>10/21/19</a:t>
+              <a:t>11/3/19</a:t>
             </a:fld>
             <a:endParaRPr lang="en-US"/>
           </a:p>
@@ -2386,7 +2389,7 @@
           <a:p>
             <a:fld id="{C9D7E1C7-362E-0A4F-BED6-EEFD53131585}" type="datetimeFigureOut">
               <a:rPr lang="en-US" smtClean="0"/>
-              <a:t>10/21/19</a:t>
+              <a:t>11/3/19</a:t>
             </a:fld>
             <a:endParaRPr lang="en-US"/>
           </a:p>
@@ -2674,7 +2677,7 @@
           <a:p>
             <a:fld id="{C9D7E1C7-362E-0A4F-BED6-EEFD53131585}" type="datetimeFigureOut">
               <a:rPr lang="en-US" smtClean="0"/>
-              <a:t>10/21/19</a:t>
+              <a:t>11/3/19</a:t>
             </a:fld>
             <a:endParaRPr lang="en-US"/>
           </a:p>
@@ -2915,7 +2918,7 @@
           <a:p>
             <a:fld id="{C9D7E1C7-362E-0A4F-BED6-EEFD53131585}" type="datetimeFigureOut">
               <a:rPr lang="en-US" smtClean="0"/>
-              <a:t>10/21/19</a:t>
+              <a:t>11/3/19</a:t>
             </a:fld>
             <a:endParaRPr lang="en-US"/>
           </a:p>
@@ -4785,6 +4788,1763 @@
     <p:extLst>
       <p:ext uri="{BB962C8B-B14F-4D97-AF65-F5344CB8AC3E}">
         <p14:creationId xmlns:p14="http://schemas.microsoft.com/office/powerpoint/2010/main" val="3158620060"/>
+      </p:ext>
+    </p:extLst>
+  </p:cSld>
+  <p:clrMapOvr>
+    <a:masterClrMapping/>
+  </p:clrMapOvr>
+</p:sld>
+</file>
+
+<file path=ppt/slides/slide10.xml><?xml version="1.0" encoding="utf-8"?>
+<p:sld xmlns:a="http://schemas.openxmlformats.org/drawingml/2006/main" xmlns:r="http://schemas.openxmlformats.org/officeDocument/2006/relationships" xmlns:p="http://schemas.openxmlformats.org/presentationml/2006/main">
+  <p:cSld>
+    <p:spTree>
+      <p:nvGrpSpPr>
+        <p:cNvPr id="1" name=""/>
+        <p:cNvGrpSpPr/>
+        <p:nvPr/>
+      </p:nvGrpSpPr>
+      <p:grpSpPr>
+        <a:xfrm>
+          <a:off x="0" y="0"/>
+          <a:ext cx="0" cy="0"/>
+          <a:chOff x="0" y="0"/>
+          <a:chExt cx="0" cy="0"/>
+        </a:xfrm>
+      </p:grpSpPr>
+      <p:graphicFrame>
+        <p:nvGraphicFramePr>
+          <p:cNvPr id="5" name="Table 4">
+            <a:extLst>
+              <a:ext uri="{FF2B5EF4-FFF2-40B4-BE49-F238E27FC236}">
+                <a16:creationId xmlns:a16="http://schemas.microsoft.com/office/drawing/2014/main" id="{4939FBC0-565C-8341-87FA-E0C4D674769B}"/>
+              </a:ext>
+            </a:extLst>
+          </p:cNvPr>
+          <p:cNvGraphicFramePr>
+            <a:graphicFrameLocks noGrp="1"/>
+          </p:cNvGraphicFramePr>
+          <p:nvPr>
+            <p:extLst>
+              <p:ext uri="{D42A27DB-BD31-4B8C-83A1-F6EECF244321}">
+                <p14:modId xmlns:p14="http://schemas.microsoft.com/office/powerpoint/2010/main" val="2163342739"/>
+              </p:ext>
+            </p:extLst>
+          </p:nvPr>
+        </p:nvGraphicFramePr>
+        <p:xfrm>
+          <a:off x="3473450" y="1428750"/>
+          <a:ext cx="5245100" cy="4000500"/>
+        </p:xfrm>
+        <a:graphic>
+          <a:graphicData uri="http://schemas.openxmlformats.org/drawingml/2006/table">
+            <a:tbl>
+              <a:tblPr>
+                <a:tableStyleId>{00A15C55-8517-42AA-B614-E9B94910E393}</a:tableStyleId>
+              </a:tblPr>
+              <a:tblGrid>
+                <a:gridCol w="749300">
+                  <a:extLst>
+                    <a:ext uri="{9D8B030D-6E8A-4147-A177-3AD203B41FA5}">
+                      <a16:colId xmlns:a16="http://schemas.microsoft.com/office/drawing/2014/main" val="820614285"/>
+                    </a:ext>
+                  </a:extLst>
+                </a:gridCol>
+                <a:gridCol w="749300">
+                  <a:extLst>
+                    <a:ext uri="{9D8B030D-6E8A-4147-A177-3AD203B41FA5}">
+                      <a16:colId xmlns:a16="http://schemas.microsoft.com/office/drawing/2014/main" val="51381889"/>
+                    </a:ext>
+                  </a:extLst>
+                </a:gridCol>
+                <a:gridCol w="749300">
+                  <a:extLst>
+                    <a:ext uri="{9D8B030D-6E8A-4147-A177-3AD203B41FA5}">
+                      <a16:colId xmlns:a16="http://schemas.microsoft.com/office/drawing/2014/main" val="1330208143"/>
+                    </a:ext>
+                  </a:extLst>
+                </a:gridCol>
+                <a:gridCol w="749300">
+                  <a:extLst>
+                    <a:ext uri="{9D8B030D-6E8A-4147-A177-3AD203B41FA5}">
+                      <a16:colId xmlns:a16="http://schemas.microsoft.com/office/drawing/2014/main" val="3369406968"/>
+                    </a:ext>
+                  </a:extLst>
+                </a:gridCol>
+                <a:gridCol w="749300">
+                  <a:extLst>
+                    <a:ext uri="{9D8B030D-6E8A-4147-A177-3AD203B41FA5}">
+                      <a16:colId xmlns:a16="http://schemas.microsoft.com/office/drawing/2014/main" val="2218853174"/>
+                    </a:ext>
+                  </a:extLst>
+                </a:gridCol>
+                <a:gridCol w="749300">
+                  <a:extLst>
+                    <a:ext uri="{9D8B030D-6E8A-4147-A177-3AD203B41FA5}">
+                      <a16:colId xmlns:a16="http://schemas.microsoft.com/office/drawing/2014/main" val="1044150607"/>
+                    </a:ext>
+                  </a:extLst>
+                </a:gridCol>
+                <a:gridCol w="749300">
+                  <a:extLst>
+                    <a:ext uri="{9D8B030D-6E8A-4147-A177-3AD203B41FA5}">
+                      <a16:colId xmlns:a16="http://schemas.microsoft.com/office/drawing/2014/main" val="2589923993"/>
+                    </a:ext>
+                  </a:extLst>
+                </a:gridCol>
+              </a:tblGrid>
+              <a:tr h="571500">
+                <a:tc>
+                  <a:txBody>
+                    <a:bodyPr/>
+                    <a:lstStyle/>
+                    <a:p>
+                      <a:pPr algn="ctr" fontAlgn="ctr"/>
+                      <a:r>
+                        <a:rPr lang="en-US" sz="1600" u="none" strike="noStrike" dirty="0">
+                          <a:effectLst/>
+                        </a:rPr>
+                        <a:t>Nodes</a:t>
+                      </a:r>
+                      <a:endParaRPr lang="en-US" sz="1600" b="1" i="0" u="none" strike="noStrike" dirty="0">
+                        <a:solidFill>
+                          <a:srgbClr val="000000"/>
+                        </a:solidFill>
+                        <a:effectLst/>
+                        <a:latin typeface="Calibri" panose="020F0502020204030204" pitchFamily="34" charset="0"/>
+                      </a:endParaRPr>
+                    </a:p>
+                  </a:txBody>
+                  <a:tcPr marL="9525" marR="9525" marT="9525" marB="0" anchor="ctr">
+                    <a:solidFill>
+                      <a:schemeClr val="accent4">
+                        <a:lumMod val="60000"/>
+                        <a:lumOff val="40000"/>
+                      </a:schemeClr>
+                    </a:solidFill>
+                  </a:tcPr>
+                </a:tc>
+                <a:tc>
+                  <a:txBody>
+                    <a:bodyPr/>
+                    <a:lstStyle/>
+                    <a:p>
+                      <a:pPr algn="ctr" fontAlgn="ctr"/>
+                      <a:r>
+                        <a:rPr lang="en-US" sz="1600" u="none" strike="noStrike" dirty="0">
+                          <a:ln>
+                            <a:noFill/>
+                          </a:ln>
+                          <a:effectLst/>
+                        </a:rPr>
+                        <a:t>X</a:t>
+                      </a:r>
+                      <a:r>
+                        <a:rPr lang="en-US" sz="1600" u="none" strike="noStrike" baseline="-25000" dirty="0">
+                          <a:ln>
+                            <a:noFill/>
+                          </a:ln>
+                          <a:effectLst/>
+                        </a:rPr>
+                        <a:t>0</a:t>
+                      </a:r>
+                      <a:endParaRPr lang="en-US" sz="1600" b="1" i="0" u="none" strike="noStrike" dirty="0">
+                        <a:ln>
+                          <a:noFill/>
+                        </a:ln>
+                        <a:solidFill>
+                          <a:srgbClr val="000000"/>
+                        </a:solidFill>
+                        <a:effectLst/>
+                        <a:latin typeface="Calibri" panose="020F0502020204030204" pitchFamily="34" charset="0"/>
+                      </a:endParaRPr>
+                    </a:p>
+                  </a:txBody>
+                  <a:tcPr marL="9525" marR="9525" marT="9525" marB="0" anchor="ctr">
+                    <a:solidFill>
+                      <a:schemeClr val="accent4">
+                        <a:lumMod val="40000"/>
+                        <a:lumOff val="60000"/>
+                      </a:schemeClr>
+                    </a:solidFill>
+                  </a:tcPr>
+                </a:tc>
+                <a:tc>
+                  <a:txBody>
+                    <a:bodyPr/>
+                    <a:lstStyle/>
+                    <a:p>
+                      <a:pPr algn="ctr" fontAlgn="ctr"/>
+                      <a:r>
+                        <a:rPr lang="en-US" sz="1600" u="none" strike="noStrike" dirty="0">
+                          <a:ln>
+                            <a:noFill/>
+                          </a:ln>
+                          <a:effectLst/>
+                        </a:rPr>
+                        <a:t>X</a:t>
+                      </a:r>
+                      <a:r>
+                        <a:rPr lang="en-US" sz="1600" u="none" strike="noStrike" baseline="-25000" dirty="0">
+                          <a:ln>
+                            <a:noFill/>
+                          </a:ln>
+                          <a:effectLst/>
+                        </a:rPr>
+                        <a:t>1</a:t>
+                      </a:r>
+                      <a:endParaRPr lang="en-US" sz="1600" b="1" i="0" u="none" strike="noStrike" dirty="0">
+                        <a:ln>
+                          <a:noFill/>
+                        </a:ln>
+                        <a:solidFill>
+                          <a:srgbClr val="000000"/>
+                        </a:solidFill>
+                        <a:effectLst/>
+                        <a:latin typeface="Calibri" panose="020F0502020204030204" pitchFamily="34" charset="0"/>
+                      </a:endParaRPr>
+                    </a:p>
+                  </a:txBody>
+                  <a:tcPr marL="9525" marR="9525" marT="9525" marB="0" anchor="ctr">
+                    <a:solidFill>
+                      <a:schemeClr val="accent4">
+                        <a:lumMod val="40000"/>
+                        <a:lumOff val="60000"/>
+                      </a:schemeClr>
+                    </a:solidFill>
+                  </a:tcPr>
+                </a:tc>
+                <a:tc>
+                  <a:txBody>
+                    <a:bodyPr/>
+                    <a:lstStyle/>
+                    <a:p>
+                      <a:pPr algn="ctr" fontAlgn="ctr"/>
+                      <a:r>
+                        <a:rPr lang="en-US" sz="1600" u="none" strike="noStrike" dirty="0">
+                          <a:ln>
+                            <a:noFill/>
+                          </a:ln>
+                          <a:effectLst/>
+                        </a:rPr>
+                        <a:t>X</a:t>
+                      </a:r>
+                      <a:r>
+                        <a:rPr lang="en-US" sz="1600" u="none" strike="noStrike" baseline="-25000" dirty="0">
+                          <a:ln>
+                            <a:noFill/>
+                          </a:ln>
+                          <a:effectLst/>
+                        </a:rPr>
+                        <a:t>2</a:t>
+                      </a:r>
+                      <a:endParaRPr lang="en-US" sz="1600" b="1" i="0" u="none" strike="noStrike" dirty="0">
+                        <a:ln>
+                          <a:noFill/>
+                        </a:ln>
+                        <a:solidFill>
+                          <a:srgbClr val="000000"/>
+                        </a:solidFill>
+                        <a:effectLst/>
+                        <a:latin typeface="Calibri" panose="020F0502020204030204" pitchFamily="34" charset="0"/>
+                      </a:endParaRPr>
+                    </a:p>
+                  </a:txBody>
+                  <a:tcPr marL="9525" marR="9525" marT="9525" marB="0" anchor="ctr">
+                    <a:solidFill>
+                      <a:schemeClr val="accent4">
+                        <a:lumMod val="40000"/>
+                        <a:lumOff val="60000"/>
+                      </a:schemeClr>
+                    </a:solidFill>
+                  </a:tcPr>
+                </a:tc>
+                <a:tc>
+                  <a:txBody>
+                    <a:bodyPr/>
+                    <a:lstStyle/>
+                    <a:p>
+                      <a:pPr algn="ctr" fontAlgn="ctr"/>
+                      <a:r>
+                        <a:rPr lang="en-US" sz="1600" u="none" strike="noStrike" dirty="0">
+                          <a:ln>
+                            <a:noFill/>
+                          </a:ln>
+                          <a:effectLst/>
+                        </a:rPr>
+                        <a:t>X</a:t>
+                      </a:r>
+                      <a:r>
+                        <a:rPr lang="en-US" sz="1600" u="none" strike="noStrike" baseline="-25000" dirty="0">
+                          <a:ln>
+                            <a:noFill/>
+                          </a:ln>
+                          <a:effectLst/>
+                        </a:rPr>
+                        <a:t>3</a:t>
+                      </a:r>
+                      <a:endParaRPr lang="en-US" sz="1600" b="1" i="0" u="none" strike="noStrike" dirty="0">
+                        <a:ln>
+                          <a:noFill/>
+                        </a:ln>
+                        <a:solidFill>
+                          <a:srgbClr val="000000"/>
+                        </a:solidFill>
+                        <a:effectLst/>
+                        <a:latin typeface="Calibri" panose="020F0502020204030204" pitchFamily="34" charset="0"/>
+                      </a:endParaRPr>
+                    </a:p>
+                  </a:txBody>
+                  <a:tcPr marL="9525" marR="9525" marT="9525" marB="0" anchor="ctr">
+                    <a:solidFill>
+                      <a:schemeClr val="accent4">
+                        <a:lumMod val="40000"/>
+                        <a:lumOff val="60000"/>
+                      </a:schemeClr>
+                    </a:solidFill>
+                  </a:tcPr>
+                </a:tc>
+                <a:tc>
+                  <a:txBody>
+                    <a:bodyPr/>
+                    <a:lstStyle/>
+                    <a:p>
+                      <a:pPr algn="ctr" fontAlgn="ctr"/>
+                      <a:r>
+                        <a:rPr lang="en-US" sz="1600" u="none" strike="noStrike" dirty="0">
+                          <a:ln>
+                            <a:noFill/>
+                          </a:ln>
+                          <a:effectLst/>
+                        </a:rPr>
+                        <a:t>X</a:t>
+                      </a:r>
+                      <a:r>
+                        <a:rPr lang="en-US" sz="1600" u="none" strike="noStrike" baseline="-25000" dirty="0">
+                          <a:ln>
+                            <a:noFill/>
+                          </a:ln>
+                          <a:effectLst/>
+                        </a:rPr>
+                        <a:t>4</a:t>
+                      </a:r>
+                      <a:endParaRPr lang="en-US" sz="1600" b="1" i="0" u="none" strike="noStrike" dirty="0">
+                        <a:ln>
+                          <a:noFill/>
+                        </a:ln>
+                        <a:solidFill>
+                          <a:srgbClr val="000000"/>
+                        </a:solidFill>
+                        <a:effectLst/>
+                        <a:latin typeface="Calibri" panose="020F0502020204030204" pitchFamily="34" charset="0"/>
+                      </a:endParaRPr>
+                    </a:p>
+                  </a:txBody>
+                  <a:tcPr marL="9525" marR="9525" marT="9525" marB="0" anchor="ctr">
+                    <a:solidFill>
+                      <a:schemeClr val="accent4">
+                        <a:lumMod val="40000"/>
+                        <a:lumOff val="60000"/>
+                      </a:schemeClr>
+                    </a:solidFill>
+                  </a:tcPr>
+                </a:tc>
+                <a:tc>
+                  <a:txBody>
+                    <a:bodyPr/>
+                    <a:lstStyle/>
+                    <a:p>
+                      <a:pPr algn="ctr" fontAlgn="ctr"/>
+                      <a:r>
+                        <a:rPr lang="en-US" sz="1600" u="none" strike="noStrike" dirty="0">
+                          <a:ln>
+                            <a:noFill/>
+                          </a:ln>
+                          <a:effectLst/>
+                        </a:rPr>
+                        <a:t>X</a:t>
+                      </a:r>
+                      <a:r>
+                        <a:rPr lang="en-US" sz="1600" u="none" strike="noStrike" baseline="-25000" dirty="0">
+                          <a:ln>
+                            <a:noFill/>
+                          </a:ln>
+                          <a:effectLst/>
+                        </a:rPr>
+                        <a:t>5</a:t>
+                      </a:r>
+                      <a:endParaRPr lang="en-US" sz="1600" b="1" i="0" u="none" strike="noStrike" dirty="0">
+                        <a:ln>
+                          <a:noFill/>
+                        </a:ln>
+                        <a:solidFill>
+                          <a:srgbClr val="000000"/>
+                        </a:solidFill>
+                        <a:effectLst/>
+                        <a:latin typeface="Calibri" panose="020F0502020204030204" pitchFamily="34" charset="0"/>
+                      </a:endParaRPr>
+                    </a:p>
+                  </a:txBody>
+                  <a:tcPr marL="9525" marR="9525" marT="9525" marB="0" anchor="ctr">
+                    <a:solidFill>
+                      <a:schemeClr val="accent4">
+                        <a:lumMod val="40000"/>
+                        <a:lumOff val="60000"/>
+                      </a:schemeClr>
+                    </a:solidFill>
+                  </a:tcPr>
+                </a:tc>
+                <a:extLst>
+                  <a:ext uri="{0D108BD9-81ED-4DB2-BD59-A6C34878D82A}">
+                    <a16:rowId xmlns:a16="http://schemas.microsoft.com/office/drawing/2014/main" val="717596721"/>
+                  </a:ext>
+                </a:extLst>
+              </a:tr>
+              <a:tr h="571500">
+                <a:tc>
+                  <a:txBody>
+                    <a:bodyPr/>
+                    <a:lstStyle/>
+                    <a:p>
+                      <a:pPr algn="ctr" fontAlgn="ctr"/>
+                      <a:r>
+                        <a:rPr lang="en-US" sz="1600" u="none" strike="noStrike" dirty="0">
+                          <a:effectLst/>
+                        </a:rPr>
+                        <a:t>X</a:t>
+                      </a:r>
+                      <a:r>
+                        <a:rPr lang="en-US" sz="1600" u="none" strike="noStrike" baseline="-25000" dirty="0">
+                          <a:effectLst/>
+                        </a:rPr>
+                        <a:t>0</a:t>
+                      </a:r>
+                      <a:endParaRPr lang="en-US" sz="1600" b="1" i="0" u="none" strike="noStrike" dirty="0">
+                        <a:solidFill>
+                          <a:srgbClr val="000000"/>
+                        </a:solidFill>
+                        <a:effectLst/>
+                        <a:latin typeface="Calibri" panose="020F0502020204030204" pitchFamily="34" charset="0"/>
+                      </a:endParaRPr>
+                    </a:p>
+                  </a:txBody>
+                  <a:tcPr marL="9525" marR="9525" marT="9525" marB="0" anchor="ctr">
+                    <a:solidFill>
+                      <a:schemeClr val="accent4">
+                        <a:lumMod val="40000"/>
+                        <a:lumOff val="60000"/>
+                      </a:schemeClr>
+                    </a:solidFill>
+                  </a:tcPr>
+                </a:tc>
+                <a:tc>
+                  <a:txBody>
+                    <a:bodyPr/>
+                    <a:lstStyle/>
+                    <a:p>
+                      <a:pPr algn="ctr" fontAlgn="ctr"/>
+                      <a:r>
+                        <a:rPr lang="en-US" sz="1200" u="none" strike="noStrike" dirty="0">
+                          <a:effectLst/>
+                        </a:rPr>
+                        <a:t> 0</a:t>
+                      </a:r>
+                      <a:endParaRPr lang="en-US" sz="1200" b="0" i="0" u="none" strike="noStrike" dirty="0">
+                        <a:solidFill>
+                          <a:srgbClr val="000000"/>
+                        </a:solidFill>
+                        <a:effectLst/>
+                        <a:latin typeface="Calibri" panose="020F0502020204030204" pitchFamily="34" charset="0"/>
+                      </a:endParaRPr>
+                    </a:p>
+                  </a:txBody>
+                  <a:tcPr marL="9525" marR="9525" marT="9525" marB="0" anchor="ctr">
+                    <a:solidFill>
+                      <a:schemeClr val="accent2">
+                        <a:lumMod val="20000"/>
+                        <a:lumOff val="80000"/>
+                      </a:schemeClr>
+                    </a:solidFill>
+                  </a:tcPr>
+                </a:tc>
+                <a:tc>
+                  <a:txBody>
+                    <a:bodyPr/>
+                    <a:lstStyle/>
+                    <a:p>
+                      <a:pPr algn="ctr" fontAlgn="ctr"/>
+                      <a:r>
+                        <a:rPr lang="en-US" sz="1200" u="none" strike="noStrike" dirty="0">
+                          <a:effectLst/>
+                        </a:rPr>
+                        <a:t>20</a:t>
+                      </a:r>
+                      <a:endParaRPr lang="en-US" sz="1200" b="0" i="0" u="none" strike="noStrike" dirty="0">
+                        <a:solidFill>
+                          <a:srgbClr val="000000"/>
+                        </a:solidFill>
+                        <a:effectLst/>
+                        <a:latin typeface="Calibri" panose="020F0502020204030204" pitchFamily="34" charset="0"/>
+                      </a:endParaRPr>
+                    </a:p>
+                  </a:txBody>
+                  <a:tcPr marL="9525" marR="9525" marT="9525" marB="0" anchor="ctr">
+                    <a:solidFill>
+                      <a:schemeClr val="accent2">
+                        <a:lumMod val="20000"/>
+                        <a:lumOff val="80000"/>
+                      </a:schemeClr>
+                    </a:solidFill>
+                  </a:tcPr>
+                </a:tc>
+                <a:tc>
+                  <a:txBody>
+                    <a:bodyPr/>
+                    <a:lstStyle/>
+                    <a:p>
+                      <a:pPr algn="ctr" fontAlgn="ctr"/>
+                      <a:r>
+                        <a:rPr lang="en-US" sz="1200" u="none" strike="noStrike" dirty="0">
+                          <a:effectLst/>
+                        </a:rPr>
+                        <a:t>0 </a:t>
+                      </a:r>
+                      <a:endParaRPr lang="en-US" sz="1200" b="0" i="0" u="none" strike="noStrike" dirty="0">
+                        <a:solidFill>
+                          <a:srgbClr val="000000"/>
+                        </a:solidFill>
+                        <a:effectLst/>
+                        <a:latin typeface="Calibri" panose="020F0502020204030204" pitchFamily="34" charset="0"/>
+                      </a:endParaRPr>
+                    </a:p>
+                  </a:txBody>
+                  <a:tcPr marL="9525" marR="9525" marT="9525" marB="0" anchor="ctr">
+                    <a:solidFill>
+                      <a:schemeClr val="accent2">
+                        <a:lumMod val="20000"/>
+                        <a:lumOff val="80000"/>
+                      </a:schemeClr>
+                    </a:solidFill>
+                  </a:tcPr>
+                </a:tc>
+                <a:tc>
+                  <a:txBody>
+                    <a:bodyPr/>
+                    <a:lstStyle/>
+                    <a:p>
+                      <a:pPr algn="ctr" fontAlgn="ctr"/>
+                      <a:r>
+                        <a:rPr lang="en-US" sz="1200" u="none" strike="noStrike" dirty="0">
+                          <a:effectLst/>
+                        </a:rPr>
+                        <a:t>0 </a:t>
+                      </a:r>
+                      <a:endParaRPr lang="en-US" sz="1200" b="0" i="0" u="none" strike="noStrike" dirty="0">
+                        <a:solidFill>
+                          <a:srgbClr val="000000"/>
+                        </a:solidFill>
+                        <a:effectLst/>
+                        <a:latin typeface="Calibri" panose="020F0502020204030204" pitchFamily="34" charset="0"/>
+                      </a:endParaRPr>
+                    </a:p>
+                  </a:txBody>
+                  <a:tcPr marL="9525" marR="9525" marT="9525" marB="0" anchor="ctr">
+                    <a:solidFill>
+                      <a:schemeClr val="accent2">
+                        <a:lumMod val="20000"/>
+                        <a:lumOff val="80000"/>
+                      </a:schemeClr>
+                    </a:solidFill>
+                  </a:tcPr>
+                </a:tc>
+                <a:tc>
+                  <a:txBody>
+                    <a:bodyPr/>
+                    <a:lstStyle/>
+                    <a:p>
+                      <a:pPr algn="ctr" fontAlgn="ctr"/>
+                      <a:r>
+                        <a:rPr lang="en-US" sz="1200" u="none" strike="noStrike" dirty="0">
+                          <a:effectLst/>
+                        </a:rPr>
+                        <a:t>0 </a:t>
+                      </a:r>
+                      <a:endParaRPr lang="en-US" sz="1200" b="0" i="0" u="none" strike="noStrike" dirty="0">
+                        <a:solidFill>
+                          <a:srgbClr val="000000"/>
+                        </a:solidFill>
+                        <a:effectLst/>
+                        <a:latin typeface="Calibri" panose="020F0502020204030204" pitchFamily="34" charset="0"/>
+                      </a:endParaRPr>
+                    </a:p>
+                  </a:txBody>
+                  <a:tcPr marL="9525" marR="9525" marT="9525" marB="0" anchor="ctr">
+                    <a:solidFill>
+                      <a:schemeClr val="accent2">
+                        <a:lumMod val="20000"/>
+                        <a:lumOff val="80000"/>
+                      </a:schemeClr>
+                    </a:solidFill>
+                  </a:tcPr>
+                </a:tc>
+                <a:tc>
+                  <a:txBody>
+                    <a:bodyPr/>
+                    <a:lstStyle/>
+                    <a:p>
+                      <a:pPr algn="ctr" fontAlgn="ctr"/>
+                      <a:r>
+                        <a:rPr lang="en-US" sz="1200" u="none" strike="noStrike" dirty="0">
+                          <a:effectLst/>
+                        </a:rPr>
+                        <a:t>50 </a:t>
+                      </a:r>
+                      <a:endParaRPr lang="en-US" sz="1200" b="0" i="0" u="none" strike="noStrike" dirty="0">
+                        <a:solidFill>
+                          <a:srgbClr val="000000"/>
+                        </a:solidFill>
+                        <a:effectLst/>
+                        <a:latin typeface="Calibri" panose="020F0502020204030204" pitchFamily="34" charset="0"/>
+                      </a:endParaRPr>
+                    </a:p>
+                  </a:txBody>
+                  <a:tcPr marL="9525" marR="9525" marT="9525" marB="0" anchor="ctr">
+                    <a:solidFill>
+                      <a:schemeClr val="accent2">
+                        <a:lumMod val="20000"/>
+                        <a:lumOff val="80000"/>
+                      </a:schemeClr>
+                    </a:solidFill>
+                  </a:tcPr>
+                </a:tc>
+                <a:extLst>
+                  <a:ext uri="{0D108BD9-81ED-4DB2-BD59-A6C34878D82A}">
+                    <a16:rowId xmlns:a16="http://schemas.microsoft.com/office/drawing/2014/main" val="3652625061"/>
+                  </a:ext>
+                </a:extLst>
+              </a:tr>
+              <a:tr h="571500">
+                <a:tc>
+                  <a:txBody>
+                    <a:bodyPr/>
+                    <a:lstStyle/>
+                    <a:p>
+                      <a:pPr algn="ctr" fontAlgn="ctr"/>
+                      <a:r>
+                        <a:rPr lang="en-US" sz="1600" u="none" strike="noStrike" dirty="0">
+                          <a:effectLst/>
+                        </a:rPr>
+                        <a:t>X</a:t>
+                      </a:r>
+                      <a:r>
+                        <a:rPr lang="en-US" sz="1600" u="none" strike="noStrike" baseline="-25000" dirty="0">
+                          <a:effectLst/>
+                        </a:rPr>
+                        <a:t>1</a:t>
+                      </a:r>
+                      <a:endParaRPr lang="en-US" sz="1600" b="1" i="0" u="none" strike="noStrike" dirty="0">
+                        <a:solidFill>
+                          <a:srgbClr val="000000"/>
+                        </a:solidFill>
+                        <a:effectLst/>
+                        <a:latin typeface="Calibri" panose="020F0502020204030204" pitchFamily="34" charset="0"/>
+                      </a:endParaRPr>
+                    </a:p>
+                  </a:txBody>
+                  <a:tcPr marL="9525" marR="9525" marT="9525" marB="0" anchor="ctr">
+                    <a:solidFill>
+                      <a:schemeClr val="accent4">
+                        <a:lumMod val="40000"/>
+                        <a:lumOff val="60000"/>
+                      </a:schemeClr>
+                    </a:solidFill>
+                  </a:tcPr>
+                </a:tc>
+                <a:tc>
+                  <a:txBody>
+                    <a:bodyPr/>
+                    <a:lstStyle/>
+                    <a:p>
+                      <a:pPr algn="ctr" fontAlgn="ctr"/>
+                      <a:r>
+                        <a:rPr lang="en-US" sz="1200" u="none" strike="noStrike" dirty="0">
+                          <a:effectLst/>
+                        </a:rPr>
+                        <a:t>10 </a:t>
+                      </a:r>
+                      <a:endParaRPr lang="en-US" sz="1200" b="0" i="0" u="none" strike="noStrike" dirty="0">
+                        <a:solidFill>
+                          <a:srgbClr val="000000"/>
+                        </a:solidFill>
+                        <a:effectLst/>
+                        <a:latin typeface="Calibri" panose="020F0502020204030204" pitchFamily="34" charset="0"/>
+                      </a:endParaRPr>
+                    </a:p>
+                  </a:txBody>
+                  <a:tcPr marL="9525" marR="9525" marT="9525" marB="0" anchor="ctr">
+                    <a:solidFill>
+                      <a:schemeClr val="accent2">
+                        <a:lumMod val="20000"/>
+                        <a:lumOff val="80000"/>
+                      </a:schemeClr>
+                    </a:solidFill>
+                  </a:tcPr>
+                </a:tc>
+                <a:tc>
+                  <a:txBody>
+                    <a:bodyPr/>
+                    <a:lstStyle/>
+                    <a:p>
+                      <a:pPr algn="ctr" fontAlgn="ctr"/>
+                      <a:r>
+                        <a:rPr lang="en-US" sz="1200" u="none" strike="noStrike" dirty="0">
+                          <a:effectLst/>
+                        </a:rPr>
+                        <a:t>0 </a:t>
+                      </a:r>
+                      <a:endParaRPr lang="en-US" sz="1200" b="0" i="0" u="none" strike="noStrike" dirty="0">
+                        <a:solidFill>
+                          <a:srgbClr val="000000"/>
+                        </a:solidFill>
+                        <a:effectLst/>
+                        <a:latin typeface="Calibri" panose="020F0502020204030204" pitchFamily="34" charset="0"/>
+                      </a:endParaRPr>
+                    </a:p>
+                  </a:txBody>
+                  <a:tcPr marL="9525" marR="9525" marT="9525" marB="0" anchor="ctr">
+                    <a:solidFill>
+                      <a:schemeClr val="accent2">
+                        <a:lumMod val="20000"/>
+                        <a:lumOff val="80000"/>
+                      </a:schemeClr>
+                    </a:solidFill>
+                  </a:tcPr>
+                </a:tc>
+                <a:tc>
+                  <a:txBody>
+                    <a:bodyPr/>
+                    <a:lstStyle/>
+                    <a:p>
+                      <a:pPr algn="ctr" fontAlgn="ctr"/>
+                      <a:r>
+                        <a:rPr lang="en-US" sz="1200" u="none" strike="noStrike" dirty="0">
+                          <a:effectLst/>
+                        </a:rPr>
+                        <a:t> 50</a:t>
+                      </a:r>
+                      <a:endParaRPr lang="en-US" sz="1200" b="0" i="0" u="none" strike="noStrike" dirty="0">
+                        <a:solidFill>
+                          <a:srgbClr val="000000"/>
+                        </a:solidFill>
+                        <a:effectLst/>
+                        <a:latin typeface="Calibri" panose="020F0502020204030204" pitchFamily="34" charset="0"/>
+                      </a:endParaRPr>
+                    </a:p>
+                  </a:txBody>
+                  <a:tcPr marL="9525" marR="9525" marT="9525" marB="0" anchor="ctr">
+                    <a:solidFill>
+                      <a:schemeClr val="accent2">
+                        <a:lumMod val="20000"/>
+                        <a:lumOff val="80000"/>
+                      </a:schemeClr>
+                    </a:solidFill>
+                  </a:tcPr>
+                </a:tc>
+                <a:tc>
+                  <a:txBody>
+                    <a:bodyPr/>
+                    <a:lstStyle/>
+                    <a:p>
+                      <a:pPr algn="ctr" fontAlgn="ctr"/>
+                      <a:r>
+                        <a:rPr lang="en-US" sz="1200" u="none" strike="noStrike" dirty="0">
+                          <a:effectLst/>
+                        </a:rPr>
+                        <a:t> 0</a:t>
+                      </a:r>
+                      <a:endParaRPr lang="en-US" sz="1200" b="0" i="0" u="none" strike="noStrike" dirty="0">
+                        <a:solidFill>
+                          <a:srgbClr val="000000"/>
+                        </a:solidFill>
+                        <a:effectLst/>
+                        <a:latin typeface="Calibri" panose="020F0502020204030204" pitchFamily="34" charset="0"/>
+                      </a:endParaRPr>
+                    </a:p>
+                  </a:txBody>
+                  <a:tcPr marL="9525" marR="9525" marT="9525" marB="0" anchor="ctr">
+                    <a:solidFill>
+                      <a:schemeClr val="accent2">
+                        <a:lumMod val="20000"/>
+                        <a:lumOff val="80000"/>
+                      </a:schemeClr>
+                    </a:solidFill>
+                  </a:tcPr>
+                </a:tc>
+                <a:tc>
+                  <a:txBody>
+                    <a:bodyPr/>
+                    <a:lstStyle/>
+                    <a:p>
+                      <a:pPr algn="ctr" fontAlgn="ctr"/>
+                      <a:r>
+                        <a:rPr lang="en-US" sz="1200" u="none" strike="noStrike" dirty="0">
+                          <a:effectLst/>
+                        </a:rPr>
+                        <a:t>0 </a:t>
+                      </a:r>
+                      <a:endParaRPr lang="en-US" sz="1200" b="0" i="0" u="none" strike="noStrike" dirty="0">
+                        <a:solidFill>
+                          <a:srgbClr val="000000"/>
+                        </a:solidFill>
+                        <a:effectLst/>
+                        <a:latin typeface="Calibri" panose="020F0502020204030204" pitchFamily="34" charset="0"/>
+                      </a:endParaRPr>
+                    </a:p>
+                  </a:txBody>
+                  <a:tcPr marL="9525" marR="9525" marT="9525" marB="0" anchor="ctr">
+                    <a:solidFill>
+                      <a:schemeClr val="accent2">
+                        <a:lumMod val="20000"/>
+                        <a:lumOff val="80000"/>
+                      </a:schemeClr>
+                    </a:solidFill>
+                  </a:tcPr>
+                </a:tc>
+                <a:tc>
+                  <a:txBody>
+                    <a:bodyPr/>
+                    <a:lstStyle/>
+                    <a:p>
+                      <a:pPr algn="ctr" fontAlgn="ctr"/>
+                      <a:r>
+                        <a:rPr lang="en-US" sz="1200" u="none" strike="noStrike" dirty="0">
+                          <a:effectLst/>
+                        </a:rPr>
+                        <a:t> 0</a:t>
+                      </a:r>
+                      <a:endParaRPr lang="en-US" sz="1200" b="0" i="0" u="none" strike="noStrike" dirty="0">
+                        <a:solidFill>
+                          <a:srgbClr val="000000"/>
+                        </a:solidFill>
+                        <a:effectLst/>
+                        <a:latin typeface="Calibri" panose="020F0502020204030204" pitchFamily="34" charset="0"/>
+                      </a:endParaRPr>
+                    </a:p>
+                  </a:txBody>
+                  <a:tcPr marL="9525" marR="9525" marT="9525" marB="0" anchor="ctr">
+                    <a:solidFill>
+                      <a:schemeClr val="accent2">
+                        <a:lumMod val="20000"/>
+                        <a:lumOff val="80000"/>
+                      </a:schemeClr>
+                    </a:solidFill>
+                  </a:tcPr>
+                </a:tc>
+                <a:extLst>
+                  <a:ext uri="{0D108BD9-81ED-4DB2-BD59-A6C34878D82A}">
+                    <a16:rowId xmlns:a16="http://schemas.microsoft.com/office/drawing/2014/main" val="1395213566"/>
+                  </a:ext>
+                </a:extLst>
+              </a:tr>
+              <a:tr h="571500">
+                <a:tc>
+                  <a:txBody>
+                    <a:bodyPr/>
+                    <a:lstStyle/>
+                    <a:p>
+                      <a:pPr algn="ctr" fontAlgn="ctr"/>
+                      <a:r>
+                        <a:rPr lang="en-US" sz="1600" u="none" strike="noStrike" dirty="0">
+                          <a:effectLst/>
+                        </a:rPr>
+                        <a:t>X</a:t>
+                      </a:r>
+                      <a:r>
+                        <a:rPr lang="en-US" sz="1600" u="none" strike="noStrike" baseline="-25000" dirty="0">
+                          <a:effectLst/>
+                        </a:rPr>
+                        <a:t>2</a:t>
+                      </a:r>
+                      <a:endParaRPr lang="en-US" sz="1600" b="1" i="0" u="none" strike="noStrike" dirty="0">
+                        <a:solidFill>
+                          <a:srgbClr val="000000"/>
+                        </a:solidFill>
+                        <a:effectLst/>
+                        <a:latin typeface="Calibri" panose="020F0502020204030204" pitchFamily="34" charset="0"/>
+                      </a:endParaRPr>
+                    </a:p>
+                  </a:txBody>
+                  <a:tcPr marL="9525" marR="9525" marT="9525" marB="0" anchor="ctr">
+                    <a:solidFill>
+                      <a:schemeClr val="accent4">
+                        <a:lumMod val="40000"/>
+                        <a:lumOff val="60000"/>
+                      </a:schemeClr>
+                    </a:solidFill>
+                  </a:tcPr>
+                </a:tc>
+                <a:tc>
+                  <a:txBody>
+                    <a:bodyPr/>
+                    <a:lstStyle/>
+                    <a:p>
+                      <a:pPr algn="ctr" fontAlgn="ctr"/>
+                      <a:r>
+                        <a:rPr lang="en-US" sz="1200" u="none" strike="noStrike" dirty="0">
+                          <a:effectLst/>
+                        </a:rPr>
+                        <a:t>0 </a:t>
+                      </a:r>
+                      <a:endParaRPr lang="en-US" sz="1200" b="0" i="0" u="none" strike="noStrike" dirty="0">
+                        <a:solidFill>
+                          <a:srgbClr val="000000"/>
+                        </a:solidFill>
+                        <a:effectLst/>
+                        <a:latin typeface="Calibri" panose="020F0502020204030204" pitchFamily="34" charset="0"/>
+                      </a:endParaRPr>
+                    </a:p>
+                  </a:txBody>
+                  <a:tcPr marL="9525" marR="9525" marT="9525" marB="0" anchor="ctr">
+                    <a:solidFill>
+                      <a:schemeClr val="accent2">
+                        <a:lumMod val="20000"/>
+                        <a:lumOff val="80000"/>
+                      </a:schemeClr>
+                    </a:solidFill>
+                  </a:tcPr>
+                </a:tc>
+                <a:tc>
+                  <a:txBody>
+                    <a:bodyPr/>
+                    <a:lstStyle/>
+                    <a:p>
+                      <a:pPr algn="ctr" fontAlgn="ctr"/>
+                      <a:r>
+                        <a:rPr lang="en-US" sz="1200" u="none" strike="noStrike" dirty="0">
+                          <a:effectLst/>
+                        </a:rPr>
+                        <a:t> 40</a:t>
+                      </a:r>
+                      <a:endParaRPr lang="en-US" sz="1200" b="0" i="0" u="none" strike="noStrike" dirty="0">
+                        <a:solidFill>
+                          <a:srgbClr val="000000"/>
+                        </a:solidFill>
+                        <a:effectLst/>
+                        <a:latin typeface="Calibri" panose="020F0502020204030204" pitchFamily="34" charset="0"/>
+                      </a:endParaRPr>
+                    </a:p>
+                  </a:txBody>
+                  <a:tcPr marL="9525" marR="9525" marT="9525" marB="0" anchor="ctr">
+                    <a:solidFill>
+                      <a:schemeClr val="accent2">
+                        <a:lumMod val="20000"/>
+                        <a:lumOff val="80000"/>
+                      </a:schemeClr>
+                    </a:solidFill>
+                  </a:tcPr>
+                </a:tc>
+                <a:tc>
+                  <a:txBody>
+                    <a:bodyPr/>
+                    <a:lstStyle/>
+                    <a:p>
+                      <a:pPr algn="ctr" fontAlgn="ctr"/>
+                      <a:r>
+                        <a:rPr lang="en-US" sz="1200" b="0" i="0" u="none" strike="noStrike" dirty="0">
+                          <a:solidFill>
+                            <a:srgbClr val="000000"/>
+                          </a:solidFill>
+                          <a:effectLst/>
+                          <a:latin typeface="Calibri" panose="020F0502020204030204" pitchFamily="34" charset="0"/>
+                        </a:rPr>
+                        <a:t>0</a:t>
+                      </a:r>
+                    </a:p>
+                  </a:txBody>
+                  <a:tcPr marL="9525" marR="9525" marT="9525" marB="0" anchor="ctr">
+                    <a:solidFill>
+                      <a:schemeClr val="accent2">
+                        <a:lumMod val="20000"/>
+                        <a:lumOff val="80000"/>
+                      </a:schemeClr>
+                    </a:solidFill>
+                  </a:tcPr>
+                </a:tc>
+                <a:tc>
+                  <a:txBody>
+                    <a:bodyPr/>
+                    <a:lstStyle/>
+                    <a:p>
+                      <a:pPr algn="ctr" fontAlgn="ctr"/>
+                      <a:r>
+                        <a:rPr lang="en-US" sz="1200" u="none" strike="noStrike" dirty="0">
+                          <a:effectLst/>
+                        </a:rPr>
+                        <a:t> 10</a:t>
+                      </a:r>
+                      <a:endParaRPr lang="en-US" sz="1200" b="0" i="0" u="none" strike="noStrike" dirty="0">
+                        <a:solidFill>
+                          <a:srgbClr val="000000"/>
+                        </a:solidFill>
+                        <a:effectLst/>
+                        <a:latin typeface="Calibri" panose="020F0502020204030204" pitchFamily="34" charset="0"/>
+                      </a:endParaRPr>
+                    </a:p>
+                  </a:txBody>
+                  <a:tcPr marL="9525" marR="9525" marT="9525" marB="0" anchor="ctr">
+                    <a:solidFill>
+                      <a:schemeClr val="accent2">
+                        <a:lumMod val="20000"/>
+                        <a:lumOff val="80000"/>
+                      </a:schemeClr>
+                    </a:solidFill>
+                  </a:tcPr>
+                </a:tc>
+                <a:tc>
+                  <a:txBody>
+                    <a:bodyPr/>
+                    <a:lstStyle/>
+                    <a:p>
+                      <a:pPr algn="ctr" fontAlgn="ctr"/>
+                      <a:r>
+                        <a:rPr lang="en-US" sz="1200" u="none" strike="noStrike" dirty="0">
+                          <a:effectLst/>
+                        </a:rPr>
+                        <a:t> 10</a:t>
+                      </a:r>
+                      <a:endParaRPr lang="en-US" sz="1200" b="0" i="0" u="none" strike="noStrike" dirty="0">
+                        <a:solidFill>
+                          <a:srgbClr val="000000"/>
+                        </a:solidFill>
+                        <a:effectLst/>
+                        <a:latin typeface="Calibri" panose="020F0502020204030204" pitchFamily="34" charset="0"/>
+                      </a:endParaRPr>
+                    </a:p>
+                  </a:txBody>
+                  <a:tcPr marL="9525" marR="9525" marT="9525" marB="0" anchor="ctr">
+                    <a:solidFill>
+                      <a:schemeClr val="accent2">
+                        <a:lumMod val="20000"/>
+                        <a:lumOff val="80000"/>
+                      </a:schemeClr>
+                    </a:solidFill>
+                  </a:tcPr>
+                </a:tc>
+                <a:tc>
+                  <a:txBody>
+                    <a:bodyPr/>
+                    <a:lstStyle/>
+                    <a:p>
+                      <a:pPr algn="ctr" fontAlgn="ctr"/>
+                      <a:r>
+                        <a:rPr lang="en-US" sz="1200" u="none" strike="noStrike" dirty="0">
+                          <a:effectLst/>
+                        </a:rPr>
+                        <a:t>0 </a:t>
+                      </a:r>
+                      <a:endParaRPr lang="en-US" sz="1200" b="0" i="0" u="none" strike="noStrike" dirty="0">
+                        <a:solidFill>
+                          <a:srgbClr val="000000"/>
+                        </a:solidFill>
+                        <a:effectLst/>
+                        <a:latin typeface="Calibri" panose="020F0502020204030204" pitchFamily="34" charset="0"/>
+                      </a:endParaRPr>
+                    </a:p>
+                  </a:txBody>
+                  <a:tcPr marL="9525" marR="9525" marT="9525" marB="0" anchor="ctr">
+                    <a:solidFill>
+                      <a:schemeClr val="accent2">
+                        <a:lumMod val="20000"/>
+                        <a:lumOff val="80000"/>
+                      </a:schemeClr>
+                    </a:solidFill>
+                  </a:tcPr>
+                </a:tc>
+                <a:extLst>
+                  <a:ext uri="{0D108BD9-81ED-4DB2-BD59-A6C34878D82A}">
+                    <a16:rowId xmlns:a16="http://schemas.microsoft.com/office/drawing/2014/main" val="763912984"/>
+                  </a:ext>
+                </a:extLst>
+              </a:tr>
+              <a:tr h="571500">
+                <a:tc>
+                  <a:txBody>
+                    <a:bodyPr/>
+                    <a:lstStyle/>
+                    <a:p>
+                      <a:pPr algn="ctr" fontAlgn="ctr"/>
+                      <a:r>
+                        <a:rPr lang="en-US" sz="1600" u="none" strike="noStrike" dirty="0">
+                          <a:effectLst/>
+                        </a:rPr>
+                        <a:t>X</a:t>
+                      </a:r>
+                      <a:r>
+                        <a:rPr lang="en-US" sz="1600" u="none" strike="noStrike" baseline="-25000" dirty="0">
+                          <a:effectLst/>
+                        </a:rPr>
+                        <a:t>3</a:t>
+                      </a:r>
+                      <a:endParaRPr lang="en-US" sz="1600" b="1" i="0" u="none" strike="noStrike" dirty="0">
+                        <a:solidFill>
+                          <a:srgbClr val="000000"/>
+                        </a:solidFill>
+                        <a:effectLst/>
+                        <a:latin typeface="Calibri" panose="020F0502020204030204" pitchFamily="34" charset="0"/>
+                      </a:endParaRPr>
+                    </a:p>
+                  </a:txBody>
+                  <a:tcPr marL="9525" marR="9525" marT="9525" marB="0" anchor="ctr">
+                    <a:solidFill>
+                      <a:schemeClr val="accent4">
+                        <a:lumMod val="40000"/>
+                        <a:lumOff val="60000"/>
+                      </a:schemeClr>
+                    </a:solidFill>
+                  </a:tcPr>
+                </a:tc>
+                <a:tc>
+                  <a:txBody>
+                    <a:bodyPr/>
+                    <a:lstStyle/>
+                    <a:p>
+                      <a:pPr algn="ctr" fontAlgn="ctr"/>
+                      <a:r>
+                        <a:rPr lang="en-US" sz="1200" u="none" strike="noStrike" dirty="0">
+                          <a:effectLst/>
+                        </a:rPr>
+                        <a:t>0 </a:t>
+                      </a:r>
+                      <a:endParaRPr lang="en-US" sz="1200" b="0" i="0" u="none" strike="noStrike" dirty="0">
+                        <a:solidFill>
+                          <a:srgbClr val="000000"/>
+                        </a:solidFill>
+                        <a:effectLst/>
+                        <a:latin typeface="Calibri" panose="020F0502020204030204" pitchFamily="34" charset="0"/>
+                      </a:endParaRPr>
+                    </a:p>
+                  </a:txBody>
+                  <a:tcPr marL="9525" marR="9525" marT="9525" marB="0" anchor="ctr">
+                    <a:solidFill>
+                      <a:schemeClr val="accent2">
+                        <a:lumMod val="20000"/>
+                        <a:lumOff val="80000"/>
+                      </a:schemeClr>
+                    </a:solidFill>
+                  </a:tcPr>
+                </a:tc>
+                <a:tc>
+                  <a:txBody>
+                    <a:bodyPr/>
+                    <a:lstStyle/>
+                    <a:p>
+                      <a:pPr algn="ctr" fontAlgn="ctr"/>
+                      <a:r>
+                        <a:rPr lang="en-US" sz="1200" u="none" strike="noStrike" dirty="0">
+                          <a:effectLst/>
+                        </a:rPr>
+                        <a:t>0 </a:t>
+                      </a:r>
+                      <a:endParaRPr lang="en-US" sz="1200" b="0" i="0" u="none" strike="noStrike" dirty="0">
+                        <a:solidFill>
+                          <a:srgbClr val="000000"/>
+                        </a:solidFill>
+                        <a:effectLst/>
+                        <a:latin typeface="Calibri" panose="020F0502020204030204" pitchFamily="34" charset="0"/>
+                      </a:endParaRPr>
+                    </a:p>
+                  </a:txBody>
+                  <a:tcPr marL="9525" marR="9525" marT="9525" marB="0" anchor="ctr">
+                    <a:solidFill>
+                      <a:schemeClr val="accent2">
+                        <a:lumMod val="20000"/>
+                        <a:lumOff val="80000"/>
+                      </a:schemeClr>
+                    </a:solidFill>
+                  </a:tcPr>
+                </a:tc>
+                <a:tc>
+                  <a:txBody>
+                    <a:bodyPr/>
+                    <a:lstStyle/>
+                    <a:p>
+                      <a:pPr algn="ctr" fontAlgn="ctr"/>
+                      <a:r>
+                        <a:rPr lang="en-US" sz="1200" u="none" strike="noStrike" dirty="0">
+                          <a:effectLst/>
+                        </a:rPr>
+                        <a:t> 20</a:t>
+                      </a:r>
+                      <a:endParaRPr lang="en-US" sz="1200" b="0" i="0" u="none" strike="noStrike" dirty="0">
+                        <a:solidFill>
+                          <a:srgbClr val="000000"/>
+                        </a:solidFill>
+                        <a:effectLst/>
+                        <a:latin typeface="Calibri" panose="020F0502020204030204" pitchFamily="34" charset="0"/>
+                      </a:endParaRPr>
+                    </a:p>
+                  </a:txBody>
+                  <a:tcPr marL="9525" marR="9525" marT="9525" marB="0" anchor="ctr">
+                    <a:solidFill>
+                      <a:schemeClr val="accent2">
+                        <a:lumMod val="20000"/>
+                        <a:lumOff val="80000"/>
+                      </a:schemeClr>
+                    </a:solidFill>
+                  </a:tcPr>
+                </a:tc>
+                <a:tc>
+                  <a:txBody>
+                    <a:bodyPr/>
+                    <a:lstStyle/>
+                    <a:p>
+                      <a:pPr algn="ctr" fontAlgn="ctr"/>
+                      <a:r>
+                        <a:rPr lang="en-US" sz="1200" u="none" strike="noStrike" dirty="0">
+                          <a:effectLst/>
+                        </a:rPr>
+                        <a:t> 0</a:t>
+                      </a:r>
+                      <a:endParaRPr lang="en-US" sz="1200" b="0" i="0" u="none" strike="noStrike" dirty="0">
+                        <a:solidFill>
+                          <a:srgbClr val="000000"/>
+                        </a:solidFill>
+                        <a:effectLst/>
+                        <a:latin typeface="Calibri" panose="020F0502020204030204" pitchFamily="34" charset="0"/>
+                      </a:endParaRPr>
+                    </a:p>
+                  </a:txBody>
+                  <a:tcPr marL="9525" marR="9525" marT="9525" marB="0" anchor="ctr">
+                    <a:solidFill>
+                      <a:schemeClr val="accent2">
+                        <a:lumMod val="20000"/>
+                        <a:lumOff val="80000"/>
+                      </a:schemeClr>
+                    </a:solidFill>
+                  </a:tcPr>
+                </a:tc>
+                <a:tc>
+                  <a:txBody>
+                    <a:bodyPr/>
+                    <a:lstStyle/>
+                    <a:p>
+                      <a:pPr algn="ctr" fontAlgn="ctr"/>
+                      <a:r>
+                        <a:rPr lang="en-US" sz="1200" u="none" strike="noStrike" dirty="0">
+                          <a:effectLst/>
+                        </a:rPr>
+                        <a:t>10 </a:t>
+                      </a:r>
+                      <a:endParaRPr lang="en-US" sz="1200" b="0" i="0" u="none" strike="noStrike" dirty="0">
+                        <a:solidFill>
+                          <a:srgbClr val="000000"/>
+                        </a:solidFill>
+                        <a:effectLst/>
+                        <a:latin typeface="Calibri" panose="020F0502020204030204" pitchFamily="34" charset="0"/>
+                      </a:endParaRPr>
+                    </a:p>
+                  </a:txBody>
+                  <a:tcPr marL="9525" marR="9525" marT="9525" marB="0" anchor="ctr">
+                    <a:solidFill>
+                      <a:schemeClr val="accent2">
+                        <a:lumMod val="20000"/>
+                        <a:lumOff val="80000"/>
+                      </a:schemeClr>
+                    </a:solidFill>
+                  </a:tcPr>
+                </a:tc>
+                <a:tc>
+                  <a:txBody>
+                    <a:bodyPr/>
+                    <a:lstStyle/>
+                    <a:p>
+                      <a:pPr algn="ctr" fontAlgn="ctr"/>
+                      <a:r>
+                        <a:rPr lang="en-US" sz="1200" u="none" strike="noStrike" dirty="0">
+                          <a:effectLst/>
+                        </a:rPr>
+                        <a:t> 0</a:t>
+                      </a:r>
+                      <a:endParaRPr lang="en-US" sz="1200" b="0" i="0" u="none" strike="noStrike" dirty="0">
+                        <a:solidFill>
+                          <a:srgbClr val="000000"/>
+                        </a:solidFill>
+                        <a:effectLst/>
+                        <a:latin typeface="Calibri" panose="020F0502020204030204" pitchFamily="34" charset="0"/>
+                      </a:endParaRPr>
+                    </a:p>
+                  </a:txBody>
+                  <a:tcPr marL="9525" marR="9525" marT="9525" marB="0" anchor="ctr">
+                    <a:solidFill>
+                      <a:schemeClr val="accent2">
+                        <a:lumMod val="20000"/>
+                        <a:lumOff val="80000"/>
+                      </a:schemeClr>
+                    </a:solidFill>
+                  </a:tcPr>
+                </a:tc>
+                <a:extLst>
+                  <a:ext uri="{0D108BD9-81ED-4DB2-BD59-A6C34878D82A}">
+                    <a16:rowId xmlns:a16="http://schemas.microsoft.com/office/drawing/2014/main" val="676619996"/>
+                  </a:ext>
+                </a:extLst>
+              </a:tr>
+              <a:tr h="571500">
+                <a:tc>
+                  <a:txBody>
+                    <a:bodyPr/>
+                    <a:lstStyle/>
+                    <a:p>
+                      <a:pPr algn="ctr" fontAlgn="ctr"/>
+                      <a:r>
+                        <a:rPr lang="en-US" sz="1600" u="none" strike="noStrike" dirty="0">
+                          <a:effectLst/>
+                        </a:rPr>
+                        <a:t>X</a:t>
+                      </a:r>
+                      <a:r>
+                        <a:rPr lang="en-US" sz="1600" u="none" strike="noStrike" baseline="-25000" dirty="0">
+                          <a:effectLst/>
+                        </a:rPr>
+                        <a:t>4</a:t>
+                      </a:r>
+                      <a:endParaRPr lang="en-US" sz="1600" b="1" i="0" u="none" strike="noStrike" dirty="0">
+                        <a:solidFill>
+                          <a:srgbClr val="000000"/>
+                        </a:solidFill>
+                        <a:effectLst/>
+                        <a:latin typeface="Calibri" panose="020F0502020204030204" pitchFamily="34" charset="0"/>
+                      </a:endParaRPr>
+                    </a:p>
+                  </a:txBody>
+                  <a:tcPr marL="9525" marR="9525" marT="9525" marB="0" anchor="ctr">
+                    <a:solidFill>
+                      <a:schemeClr val="accent4">
+                        <a:lumMod val="40000"/>
+                        <a:lumOff val="60000"/>
+                      </a:schemeClr>
+                    </a:solidFill>
+                  </a:tcPr>
+                </a:tc>
+                <a:tc>
+                  <a:txBody>
+                    <a:bodyPr/>
+                    <a:lstStyle/>
+                    <a:p>
+                      <a:pPr algn="ctr" fontAlgn="ctr"/>
+                      <a:r>
+                        <a:rPr lang="en-US" sz="1200" u="none" strike="noStrike" dirty="0">
+                          <a:effectLst/>
+                        </a:rPr>
+                        <a:t>0 </a:t>
+                      </a:r>
+                      <a:endParaRPr lang="en-US" sz="1200" b="0" i="0" u="none" strike="noStrike" dirty="0">
+                        <a:solidFill>
+                          <a:srgbClr val="000000"/>
+                        </a:solidFill>
+                        <a:effectLst/>
+                        <a:latin typeface="Calibri" panose="020F0502020204030204" pitchFamily="34" charset="0"/>
+                      </a:endParaRPr>
+                    </a:p>
+                  </a:txBody>
+                  <a:tcPr marL="9525" marR="9525" marT="9525" marB="0" anchor="ctr">
+                    <a:solidFill>
+                      <a:schemeClr val="accent2">
+                        <a:lumMod val="20000"/>
+                        <a:lumOff val="80000"/>
+                      </a:schemeClr>
+                    </a:solidFill>
+                  </a:tcPr>
+                </a:tc>
+                <a:tc>
+                  <a:txBody>
+                    <a:bodyPr/>
+                    <a:lstStyle/>
+                    <a:p>
+                      <a:pPr algn="ctr" fontAlgn="ctr"/>
+                      <a:r>
+                        <a:rPr lang="en-US" sz="1200" u="none" strike="noStrike" dirty="0">
+                          <a:effectLst/>
+                        </a:rPr>
+                        <a:t>0 </a:t>
+                      </a:r>
+                      <a:endParaRPr lang="en-US" sz="1200" b="0" i="0" u="none" strike="noStrike" dirty="0">
+                        <a:solidFill>
+                          <a:srgbClr val="000000"/>
+                        </a:solidFill>
+                        <a:effectLst/>
+                        <a:latin typeface="Calibri" panose="020F0502020204030204" pitchFamily="34" charset="0"/>
+                      </a:endParaRPr>
+                    </a:p>
+                  </a:txBody>
+                  <a:tcPr marL="9525" marR="9525" marT="9525" marB="0" anchor="ctr">
+                    <a:solidFill>
+                      <a:schemeClr val="accent2">
+                        <a:lumMod val="20000"/>
+                        <a:lumOff val="80000"/>
+                      </a:schemeClr>
+                    </a:solidFill>
+                  </a:tcPr>
+                </a:tc>
+                <a:tc>
+                  <a:txBody>
+                    <a:bodyPr/>
+                    <a:lstStyle/>
+                    <a:p>
+                      <a:pPr algn="ctr" fontAlgn="ctr"/>
+                      <a:r>
+                        <a:rPr lang="en-US" sz="1200" u="none" strike="noStrike" dirty="0">
+                          <a:effectLst/>
+                        </a:rPr>
+                        <a:t>20 </a:t>
+                      </a:r>
+                      <a:endParaRPr lang="en-US" sz="1200" b="0" i="0" u="none" strike="noStrike" dirty="0">
+                        <a:solidFill>
+                          <a:srgbClr val="000000"/>
+                        </a:solidFill>
+                        <a:effectLst/>
+                        <a:latin typeface="Calibri" panose="020F0502020204030204" pitchFamily="34" charset="0"/>
+                      </a:endParaRPr>
+                    </a:p>
+                  </a:txBody>
+                  <a:tcPr marL="9525" marR="9525" marT="9525" marB="0" anchor="ctr">
+                    <a:solidFill>
+                      <a:schemeClr val="accent2">
+                        <a:lumMod val="20000"/>
+                        <a:lumOff val="80000"/>
+                      </a:schemeClr>
+                    </a:solidFill>
+                  </a:tcPr>
+                </a:tc>
+                <a:tc>
+                  <a:txBody>
+                    <a:bodyPr/>
+                    <a:lstStyle/>
+                    <a:p>
+                      <a:pPr algn="ctr" fontAlgn="ctr"/>
+                      <a:r>
+                        <a:rPr lang="en-US" sz="1200" u="none" strike="noStrike" dirty="0">
+                          <a:effectLst/>
+                        </a:rPr>
+                        <a:t>5 </a:t>
+                      </a:r>
+                      <a:endParaRPr lang="en-US" sz="1200" b="0" i="0" u="none" strike="noStrike" dirty="0">
+                        <a:solidFill>
+                          <a:srgbClr val="000000"/>
+                        </a:solidFill>
+                        <a:effectLst/>
+                        <a:latin typeface="Calibri" panose="020F0502020204030204" pitchFamily="34" charset="0"/>
+                      </a:endParaRPr>
+                    </a:p>
+                  </a:txBody>
+                  <a:tcPr marL="9525" marR="9525" marT="9525" marB="0" anchor="ctr">
+                    <a:solidFill>
+                      <a:schemeClr val="accent2">
+                        <a:lumMod val="20000"/>
+                        <a:lumOff val="80000"/>
+                      </a:schemeClr>
+                    </a:solidFill>
+                  </a:tcPr>
+                </a:tc>
+                <a:tc>
+                  <a:txBody>
+                    <a:bodyPr/>
+                    <a:lstStyle/>
+                    <a:p>
+                      <a:pPr algn="ctr" fontAlgn="ctr"/>
+                      <a:r>
+                        <a:rPr lang="en-US" sz="1200" u="none" strike="noStrike" dirty="0">
+                          <a:effectLst/>
+                        </a:rPr>
+                        <a:t> 0</a:t>
+                      </a:r>
+                      <a:endParaRPr lang="en-US" sz="1200" b="0" i="0" u="none" strike="noStrike" dirty="0">
+                        <a:solidFill>
+                          <a:srgbClr val="000000"/>
+                        </a:solidFill>
+                        <a:effectLst/>
+                        <a:latin typeface="Calibri" panose="020F0502020204030204" pitchFamily="34" charset="0"/>
+                      </a:endParaRPr>
+                    </a:p>
+                  </a:txBody>
+                  <a:tcPr marL="9525" marR="9525" marT="9525" marB="0" anchor="ctr">
+                    <a:solidFill>
+                      <a:schemeClr val="accent2">
+                        <a:lumMod val="20000"/>
+                        <a:lumOff val="80000"/>
+                      </a:schemeClr>
+                    </a:solidFill>
+                  </a:tcPr>
+                </a:tc>
+                <a:tc>
+                  <a:txBody>
+                    <a:bodyPr/>
+                    <a:lstStyle/>
+                    <a:p>
+                      <a:pPr algn="ctr" fontAlgn="ctr"/>
+                      <a:r>
+                        <a:rPr lang="en-US" sz="1200" u="none" strike="noStrike" dirty="0">
+                          <a:effectLst/>
+                        </a:rPr>
+                        <a:t> 20</a:t>
+                      </a:r>
+                      <a:endParaRPr lang="en-US" sz="1200" b="0" i="0" u="none" strike="noStrike" dirty="0">
+                        <a:solidFill>
+                          <a:srgbClr val="000000"/>
+                        </a:solidFill>
+                        <a:effectLst/>
+                        <a:latin typeface="Calibri" panose="020F0502020204030204" pitchFamily="34" charset="0"/>
+                      </a:endParaRPr>
+                    </a:p>
+                  </a:txBody>
+                  <a:tcPr marL="9525" marR="9525" marT="9525" marB="0" anchor="ctr">
+                    <a:solidFill>
+                      <a:schemeClr val="accent2">
+                        <a:lumMod val="20000"/>
+                        <a:lumOff val="80000"/>
+                      </a:schemeClr>
+                    </a:solidFill>
+                  </a:tcPr>
+                </a:tc>
+                <a:extLst>
+                  <a:ext uri="{0D108BD9-81ED-4DB2-BD59-A6C34878D82A}">
+                    <a16:rowId xmlns:a16="http://schemas.microsoft.com/office/drawing/2014/main" val="3484265081"/>
+                  </a:ext>
+                </a:extLst>
+              </a:tr>
+              <a:tr h="571500">
+                <a:tc>
+                  <a:txBody>
+                    <a:bodyPr/>
+                    <a:lstStyle/>
+                    <a:p>
+                      <a:pPr algn="ctr" fontAlgn="ctr"/>
+                      <a:r>
+                        <a:rPr lang="en-US" sz="1600" u="none" strike="noStrike" dirty="0">
+                          <a:effectLst/>
+                        </a:rPr>
+                        <a:t>X</a:t>
+                      </a:r>
+                      <a:r>
+                        <a:rPr lang="en-US" sz="1600" u="none" strike="noStrike" baseline="-25000" dirty="0">
+                          <a:effectLst/>
+                        </a:rPr>
+                        <a:t>5</a:t>
+                      </a:r>
+                      <a:endParaRPr lang="en-US" sz="1600" b="1" i="0" u="none" strike="noStrike" dirty="0">
+                        <a:solidFill>
+                          <a:srgbClr val="000000"/>
+                        </a:solidFill>
+                        <a:effectLst/>
+                        <a:latin typeface="Calibri" panose="020F0502020204030204" pitchFamily="34" charset="0"/>
+                      </a:endParaRPr>
+                    </a:p>
+                  </a:txBody>
+                  <a:tcPr marL="9525" marR="9525" marT="9525" marB="0" anchor="ctr">
+                    <a:solidFill>
+                      <a:schemeClr val="accent4">
+                        <a:lumMod val="40000"/>
+                        <a:lumOff val="60000"/>
+                      </a:schemeClr>
+                    </a:solidFill>
+                  </a:tcPr>
+                </a:tc>
+                <a:tc>
+                  <a:txBody>
+                    <a:bodyPr/>
+                    <a:lstStyle/>
+                    <a:p>
+                      <a:pPr algn="ctr" fontAlgn="ctr"/>
+                      <a:r>
+                        <a:rPr lang="en-US" sz="1200" u="none" strike="noStrike" dirty="0">
+                          <a:effectLst/>
+                        </a:rPr>
+                        <a:t> 30</a:t>
+                      </a:r>
+                      <a:endParaRPr lang="en-US" sz="1200" b="0" i="0" u="none" strike="noStrike" dirty="0">
+                        <a:solidFill>
+                          <a:srgbClr val="000000"/>
+                        </a:solidFill>
+                        <a:effectLst/>
+                        <a:latin typeface="Calibri" panose="020F0502020204030204" pitchFamily="34" charset="0"/>
+                      </a:endParaRPr>
+                    </a:p>
+                  </a:txBody>
+                  <a:tcPr marL="9525" marR="9525" marT="9525" marB="0" anchor="ctr">
+                    <a:solidFill>
+                      <a:schemeClr val="accent2">
+                        <a:lumMod val="20000"/>
+                        <a:lumOff val="80000"/>
+                      </a:schemeClr>
+                    </a:solidFill>
+                  </a:tcPr>
+                </a:tc>
+                <a:tc>
+                  <a:txBody>
+                    <a:bodyPr/>
+                    <a:lstStyle/>
+                    <a:p>
+                      <a:pPr algn="ctr" fontAlgn="ctr"/>
+                      <a:r>
+                        <a:rPr lang="en-US" sz="1200" u="none" strike="noStrike" dirty="0">
+                          <a:effectLst/>
+                        </a:rPr>
+                        <a:t> 0</a:t>
+                      </a:r>
+                      <a:endParaRPr lang="en-US" sz="1200" b="0" i="0" u="none" strike="noStrike" dirty="0">
+                        <a:solidFill>
+                          <a:srgbClr val="000000"/>
+                        </a:solidFill>
+                        <a:effectLst/>
+                        <a:latin typeface="Calibri" panose="020F0502020204030204" pitchFamily="34" charset="0"/>
+                      </a:endParaRPr>
+                    </a:p>
+                  </a:txBody>
+                  <a:tcPr marL="9525" marR="9525" marT="9525" marB="0" anchor="ctr">
+                    <a:solidFill>
+                      <a:schemeClr val="accent2">
+                        <a:lumMod val="20000"/>
+                        <a:lumOff val="80000"/>
+                      </a:schemeClr>
+                    </a:solidFill>
+                  </a:tcPr>
+                </a:tc>
+                <a:tc>
+                  <a:txBody>
+                    <a:bodyPr/>
+                    <a:lstStyle/>
+                    <a:p>
+                      <a:pPr algn="ctr" fontAlgn="ctr"/>
+                      <a:r>
+                        <a:rPr lang="en-US" sz="1200" u="none" strike="noStrike" dirty="0">
+                          <a:effectLst/>
+                        </a:rPr>
+                        <a:t> 0</a:t>
+                      </a:r>
+                      <a:endParaRPr lang="en-US" sz="1200" b="0" i="0" u="none" strike="noStrike" dirty="0">
+                        <a:solidFill>
+                          <a:srgbClr val="000000"/>
+                        </a:solidFill>
+                        <a:effectLst/>
+                        <a:latin typeface="Calibri" panose="020F0502020204030204" pitchFamily="34" charset="0"/>
+                      </a:endParaRPr>
+                    </a:p>
+                  </a:txBody>
+                  <a:tcPr marL="9525" marR="9525" marT="9525" marB="0" anchor="ctr">
+                    <a:solidFill>
+                      <a:schemeClr val="accent2">
+                        <a:lumMod val="20000"/>
+                        <a:lumOff val="80000"/>
+                      </a:schemeClr>
+                    </a:solidFill>
+                  </a:tcPr>
+                </a:tc>
+                <a:tc>
+                  <a:txBody>
+                    <a:bodyPr/>
+                    <a:lstStyle/>
+                    <a:p>
+                      <a:pPr algn="ctr" fontAlgn="ctr"/>
+                      <a:r>
+                        <a:rPr lang="en-US" sz="1200" u="none" strike="noStrike" dirty="0">
+                          <a:effectLst/>
+                        </a:rPr>
+                        <a:t> 0</a:t>
+                      </a:r>
+                      <a:endParaRPr lang="en-US" sz="1200" b="0" i="0" u="none" strike="noStrike" dirty="0">
+                        <a:solidFill>
+                          <a:srgbClr val="000000"/>
+                        </a:solidFill>
+                        <a:effectLst/>
+                        <a:latin typeface="Calibri" panose="020F0502020204030204" pitchFamily="34" charset="0"/>
+                      </a:endParaRPr>
+                    </a:p>
+                  </a:txBody>
+                  <a:tcPr marL="9525" marR="9525" marT="9525" marB="0" anchor="ctr">
+                    <a:solidFill>
+                      <a:schemeClr val="accent2">
+                        <a:lumMod val="20000"/>
+                        <a:lumOff val="80000"/>
+                      </a:schemeClr>
+                    </a:solidFill>
+                  </a:tcPr>
+                </a:tc>
+                <a:tc>
+                  <a:txBody>
+                    <a:bodyPr/>
+                    <a:lstStyle/>
+                    <a:p>
+                      <a:pPr algn="ctr" fontAlgn="ctr"/>
+                      <a:r>
+                        <a:rPr lang="en-US" sz="1200" u="none" strike="noStrike" dirty="0">
+                          <a:effectLst/>
+                        </a:rPr>
+                        <a:t> 30</a:t>
+                      </a:r>
+                      <a:endParaRPr lang="en-US" sz="1200" b="0" i="0" u="none" strike="noStrike" dirty="0">
+                        <a:solidFill>
+                          <a:srgbClr val="000000"/>
+                        </a:solidFill>
+                        <a:effectLst/>
+                        <a:latin typeface="Calibri" panose="020F0502020204030204" pitchFamily="34" charset="0"/>
+                      </a:endParaRPr>
+                    </a:p>
+                  </a:txBody>
+                  <a:tcPr marL="9525" marR="9525" marT="9525" marB="0" anchor="ctr">
+                    <a:solidFill>
+                      <a:schemeClr val="accent2">
+                        <a:lumMod val="20000"/>
+                        <a:lumOff val="80000"/>
+                      </a:schemeClr>
+                    </a:solidFill>
+                  </a:tcPr>
+                </a:tc>
+                <a:tc>
+                  <a:txBody>
+                    <a:bodyPr/>
+                    <a:lstStyle/>
+                    <a:p>
+                      <a:pPr algn="ctr" fontAlgn="ctr"/>
+                      <a:r>
+                        <a:rPr lang="en-US" sz="1200" u="none" strike="noStrike" dirty="0">
+                          <a:effectLst/>
+                        </a:rPr>
+                        <a:t> 0</a:t>
+                      </a:r>
+                      <a:endParaRPr lang="en-US" sz="1200" b="0" i="0" u="none" strike="noStrike" dirty="0">
+                        <a:solidFill>
+                          <a:srgbClr val="000000"/>
+                        </a:solidFill>
+                        <a:effectLst/>
+                        <a:latin typeface="Calibri" panose="020F0502020204030204" pitchFamily="34" charset="0"/>
+                      </a:endParaRPr>
+                    </a:p>
+                  </a:txBody>
+                  <a:tcPr marL="9525" marR="9525" marT="9525" marB="0" anchor="ctr">
+                    <a:solidFill>
+                      <a:schemeClr val="accent2">
+                        <a:lumMod val="20000"/>
+                        <a:lumOff val="80000"/>
+                      </a:schemeClr>
+                    </a:solidFill>
+                  </a:tcPr>
+                </a:tc>
+                <a:extLst>
+                  <a:ext uri="{0D108BD9-81ED-4DB2-BD59-A6C34878D82A}">
+                    <a16:rowId xmlns:a16="http://schemas.microsoft.com/office/drawing/2014/main" val="596632790"/>
+                  </a:ext>
+                </a:extLst>
+              </a:tr>
+            </a:tbl>
+          </a:graphicData>
+        </a:graphic>
+      </p:graphicFrame>
+    </p:spTree>
+    <p:extLst>
+      <p:ext uri="{BB962C8B-B14F-4D97-AF65-F5344CB8AC3E}">
+        <p14:creationId xmlns:p14="http://schemas.microsoft.com/office/powerpoint/2010/main" val="498838808"/>
       </p:ext>
     </p:extLst>
   </p:cSld>
@@ -14143,6 +15903,1693 @@
 </p:sld>
 </file>
 
+<file path=ppt/slides/slide8.xml><?xml version="1.0" encoding="utf-8"?>
+<p:sld xmlns:a="http://schemas.openxmlformats.org/drawingml/2006/main" xmlns:r="http://schemas.openxmlformats.org/officeDocument/2006/relationships" xmlns:p="http://schemas.openxmlformats.org/presentationml/2006/main">
+  <p:cSld>
+    <p:spTree>
+      <p:nvGrpSpPr>
+        <p:cNvPr id="1" name=""/>
+        <p:cNvGrpSpPr/>
+        <p:nvPr/>
+      </p:nvGrpSpPr>
+      <p:grpSpPr>
+        <a:xfrm>
+          <a:off x="0" y="0"/>
+          <a:ext cx="0" cy="0"/>
+          <a:chOff x="0" y="0"/>
+          <a:chExt cx="0" cy="0"/>
+        </a:xfrm>
+      </p:grpSpPr>
+      <p:sp>
+        <p:nvSpPr>
+          <p:cNvPr id="4" name="TextBox 3">
+            <a:extLst>
+              <a:ext uri="{FF2B5EF4-FFF2-40B4-BE49-F238E27FC236}">
+                <a16:creationId xmlns:a16="http://schemas.microsoft.com/office/drawing/2014/main" id="{AA3F8E03-E52B-8845-8D1F-0DC4D8DD2095}"/>
+              </a:ext>
+            </a:extLst>
+          </p:cNvPr>
+          <p:cNvSpPr txBox="1"/>
+          <p:nvPr/>
+        </p:nvSpPr>
+        <p:spPr>
+          <a:xfrm>
+            <a:off x="3988130" y="3013501"/>
+            <a:ext cx="4215740" cy="830997"/>
+          </a:xfrm>
+          <a:prstGeom prst="rect">
+            <a:avLst/>
+          </a:prstGeom>
+          <a:noFill/>
+        </p:spPr>
+        <p:txBody>
+          <a:bodyPr wrap="square" rtlCol="0">
+            <a:spAutoFit/>
+          </a:bodyPr>
+          <a:lstStyle/>
+          <a:p>
+            <a:r>
+              <a:rPr lang="en-US" sz="4800" dirty="0"/>
+              <a:t>Solutions Below</a:t>
+            </a:r>
+          </a:p>
+        </p:txBody>
+      </p:sp>
+    </p:spTree>
+    <p:extLst>
+      <p:ext uri="{BB962C8B-B14F-4D97-AF65-F5344CB8AC3E}">
+        <p14:creationId xmlns:p14="http://schemas.microsoft.com/office/powerpoint/2010/main" val="2870530172"/>
+      </p:ext>
+    </p:extLst>
+  </p:cSld>
+  <p:clrMapOvr>
+    <a:masterClrMapping/>
+  </p:clrMapOvr>
+</p:sld>
+</file>
+
+<file path=ppt/slides/slide9.xml><?xml version="1.0" encoding="utf-8"?>
+<p:sld xmlns:a="http://schemas.openxmlformats.org/drawingml/2006/main" xmlns:r="http://schemas.openxmlformats.org/officeDocument/2006/relationships" xmlns:p="http://schemas.openxmlformats.org/presentationml/2006/main">
+  <p:cSld>
+    <p:spTree>
+      <p:nvGrpSpPr>
+        <p:cNvPr id="1" name=""/>
+        <p:cNvGrpSpPr/>
+        <p:nvPr/>
+      </p:nvGrpSpPr>
+      <p:grpSpPr>
+        <a:xfrm>
+          <a:off x="0" y="0"/>
+          <a:ext cx="0" cy="0"/>
+          <a:chOff x="0" y="0"/>
+          <a:chExt cx="0" cy="0"/>
+        </a:xfrm>
+      </p:grpSpPr>
+      <p:grpSp>
+        <p:nvGrpSpPr>
+          <p:cNvPr id="44" name="Group 43">
+            <a:extLst>
+              <a:ext uri="{FF2B5EF4-FFF2-40B4-BE49-F238E27FC236}">
+                <a16:creationId xmlns:a16="http://schemas.microsoft.com/office/drawing/2014/main" id="{0B807186-138A-C54E-90D9-E1EDF14899B2}"/>
+              </a:ext>
+            </a:extLst>
+          </p:cNvPr>
+          <p:cNvGrpSpPr/>
+          <p:nvPr/>
+        </p:nvGrpSpPr>
+        <p:grpSpPr>
+          <a:xfrm>
+            <a:off x="3643087" y="403761"/>
+            <a:ext cx="4905826" cy="5736681"/>
+            <a:chOff x="3643087" y="403761"/>
+            <a:chExt cx="4905826" cy="5736681"/>
+          </a:xfrm>
+        </p:grpSpPr>
+        <p:grpSp>
+          <p:nvGrpSpPr>
+            <p:cNvPr id="4" name="Group 3">
+              <a:extLst>
+                <a:ext uri="{FF2B5EF4-FFF2-40B4-BE49-F238E27FC236}">
+                  <a16:creationId xmlns:a16="http://schemas.microsoft.com/office/drawing/2014/main" id="{374D3F32-9050-C346-BAB1-E547436996C6}"/>
+                </a:ext>
+              </a:extLst>
+            </p:cNvPr>
+            <p:cNvGrpSpPr/>
+            <p:nvPr/>
+          </p:nvGrpSpPr>
+          <p:grpSpPr>
+            <a:xfrm>
+              <a:off x="3643087" y="1641206"/>
+              <a:ext cx="4905826" cy="3575587"/>
+              <a:chOff x="3538331" y="2010204"/>
+              <a:chExt cx="4905826" cy="3575587"/>
+            </a:xfrm>
+          </p:grpSpPr>
+          <p:sp>
+            <p:nvSpPr>
+              <p:cNvPr id="5" name="Oval 4">
+                <a:extLst>
+                  <a:ext uri="{FF2B5EF4-FFF2-40B4-BE49-F238E27FC236}">
+                    <a16:creationId xmlns:a16="http://schemas.microsoft.com/office/drawing/2014/main" id="{BE20CDBA-5D96-A744-BCE6-FB5F0E8AB92B}"/>
+                  </a:ext>
+                </a:extLst>
+              </p:cNvPr>
+              <p:cNvSpPr/>
+              <p:nvPr/>
+            </p:nvSpPr>
+            <p:spPr>
+              <a:xfrm>
+                <a:off x="3538331" y="2047461"/>
+                <a:ext cx="775252" cy="775252"/>
+              </a:xfrm>
+              <a:prstGeom prst="ellipse">
+                <a:avLst/>
+              </a:prstGeom>
+              <a:solidFill>
+                <a:schemeClr val="accent1">
+                  <a:lumMod val="20000"/>
+                  <a:lumOff val="80000"/>
+                </a:schemeClr>
+              </a:solidFill>
+              <a:ln>
+                <a:solidFill>
+                  <a:schemeClr val="accent1">
+                    <a:lumMod val="60000"/>
+                    <a:lumOff val="40000"/>
+                  </a:schemeClr>
+                </a:solidFill>
+              </a:ln>
+            </p:spPr>
+            <p:style>
+              <a:lnRef idx="2">
+                <a:schemeClr val="accent1">
+                  <a:shade val="50000"/>
+                </a:schemeClr>
+              </a:lnRef>
+              <a:fillRef idx="1">
+                <a:schemeClr val="accent1"/>
+              </a:fillRef>
+              <a:effectRef idx="0">
+                <a:schemeClr val="accent1"/>
+              </a:effectRef>
+              <a:fontRef idx="minor">
+                <a:schemeClr val="lt1"/>
+              </a:fontRef>
+            </p:style>
+            <p:txBody>
+              <a:bodyPr rtlCol="0" anchor="ctr"/>
+              <a:lstStyle/>
+              <a:p>
+                <a:pPr algn="ctr"/>
+                <a:r>
+                  <a:rPr lang="en-US" dirty="0">
+                    <a:solidFill>
+                      <a:schemeClr val="tx1"/>
+                    </a:solidFill>
+                  </a:rPr>
+                  <a:t>X</a:t>
+                </a:r>
+                <a:r>
+                  <a:rPr lang="en-US" baseline="-25000" dirty="0">
+                    <a:solidFill>
+                      <a:schemeClr val="tx1"/>
+                    </a:solidFill>
+                  </a:rPr>
+                  <a:t>0</a:t>
+                </a:r>
+                <a:endParaRPr lang="en-US" dirty="0">
+                  <a:solidFill>
+                    <a:schemeClr val="tx1"/>
+                  </a:solidFill>
+                </a:endParaRPr>
+              </a:p>
+            </p:txBody>
+          </p:sp>
+          <p:sp>
+            <p:nvSpPr>
+              <p:cNvPr id="6" name="Oval 5">
+                <a:extLst>
+                  <a:ext uri="{FF2B5EF4-FFF2-40B4-BE49-F238E27FC236}">
+                    <a16:creationId xmlns:a16="http://schemas.microsoft.com/office/drawing/2014/main" id="{03208BA5-6D85-264A-906E-B5AF23368F5E}"/>
+                  </a:ext>
+                </a:extLst>
+              </p:cNvPr>
+              <p:cNvSpPr/>
+              <p:nvPr/>
+            </p:nvSpPr>
+            <p:spPr>
+              <a:xfrm>
+                <a:off x="5320748" y="2047461"/>
+                <a:ext cx="775252" cy="775252"/>
+              </a:xfrm>
+              <a:prstGeom prst="ellipse">
+                <a:avLst/>
+              </a:prstGeom>
+              <a:solidFill>
+                <a:schemeClr val="accent1">
+                  <a:lumMod val="20000"/>
+                  <a:lumOff val="80000"/>
+                </a:schemeClr>
+              </a:solidFill>
+              <a:ln>
+                <a:solidFill>
+                  <a:schemeClr val="accent1">
+                    <a:lumMod val="60000"/>
+                    <a:lumOff val="40000"/>
+                  </a:schemeClr>
+                </a:solidFill>
+              </a:ln>
+            </p:spPr>
+            <p:style>
+              <a:lnRef idx="2">
+                <a:schemeClr val="accent1">
+                  <a:shade val="50000"/>
+                </a:schemeClr>
+              </a:lnRef>
+              <a:fillRef idx="1">
+                <a:schemeClr val="accent1"/>
+              </a:fillRef>
+              <a:effectRef idx="0">
+                <a:schemeClr val="accent1"/>
+              </a:effectRef>
+              <a:fontRef idx="minor">
+                <a:schemeClr val="lt1"/>
+              </a:fontRef>
+            </p:style>
+            <p:txBody>
+              <a:bodyPr rtlCol="0" anchor="ctr"/>
+              <a:lstStyle/>
+              <a:p>
+                <a:pPr algn="ctr"/>
+                <a:r>
+                  <a:rPr lang="en-US" dirty="0">
+                    <a:solidFill>
+                      <a:schemeClr val="tx1"/>
+                    </a:solidFill>
+                  </a:rPr>
+                  <a:t>X</a:t>
+                </a:r>
+                <a:r>
+                  <a:rPr lang="en-US" baseline="-25000" dirty="0">
+                    <a:solidFill>
+                      <a:schemeClr val="tx1"/>
+                    </a:solidFill>
+                  </a:rPr>
+                  <a:t>1</a:t>
+                </a:r>
+                <a:endParaRPr lang="en-US" dirty="0">
+                  <a:solidFill>
+                    <a:schemeClr val="tx1"/>
+                  </a:solidFill>
+                </a:endParaRPr>
+              </a:p>
+            </p:txBody>
+          </p:sp>
+          <p:sp>
+            <p:nvSpPr>
+              <p:cNvPr id="7" name="Oval 6">
+                <a:extLst>
+                  <a:ext uri="{FF2B5EF4-FFF2-40B4-BE49-F238E27FC236}">
+                    <a16:creationId xmlns:a16="http://schemas.microsoft.com/office/drawing/2014/main" id="{A6C2A1C4-D7C4-154A-A413-98A161B84EE4}"/>
+                  </a:ext>
+                </a:extLst>
+              </p:cNvPr>
+              <p:cNvSpPr/>
+              <p:nvPr/>
+            </p:nvSpPr>
+            <p:spPr>
+              <a:xfrm>
+                <a:off x="7103165" y="2047461"/>
+                <a:ext cx="775252" cy="775252"/>
+              </a:xfrm>
+              <a:prstGeom prst="ellipse">
+                <a:avLst/>
+              </a:prstGeom>
+              <a:solidFill>
+                <a:schemeClr val="accent1">
+                  <a:lumMod val="20000"/>
+                  <a:lumOff val="80000"/>
+                </a:schemeClr>
+              </a:solidFill>
+              <a:ln>
+                <a:solidFill>
+                  <a:schemeClr val="accent1">
+                    <a:lumMod val="60000"/>
+                    <a:lumOff val="40000"/>
+                  </a:schemeClr>
+                </a:solidFill>
+              </a:ln>
+            </p:spPr>
+            <p:style>
+              <a:lnRef idx="2">
+                <a:schemeClr val="accent1">
+                  <a:shade val="50000"/>
+                </a:schemeClr>
+              </a:lnRef>
+              <a:fillRef idx="1">
+                <a:schemeClr val="accent1"/>
+              </a:fillRef>
+              <a:effectRef idx="0">
+                <a:schemeClr val="accent1"/>
+              </a:effectRef>
+              <a:fontRef idx="minor">
+                <a:schemeClr val="lt1"/>
+              </a:fontRef>
+            </p:style>
+            <p:txBody>
+              <a:bodyPr rtlCol="0" anchor="ctr"/>
+              <a:lstStyle/>
+              <a:p>
+                <a:pPr algn="ctr"/>
+                <a:r>
+                  <a:rPr lang="en-US" dirty="0">
+                    <a:solidFill>
+                      <a:schemeClr val="tx1"/>
+                    </a:solidFill>
+                  </a:rPr>
+                  <a:t>X</a:t>
+                </a:r>
+                <a:r>
+                  <a:rPr lang="en-US" baseline="-25000" dirty="0">
+                    <a:solidFill>
+                      <a:schemeClr val="tx1"/>
+                    </a:solidFill>
+                  </a:rPr>
+                  <a:t>2</a:t>
+                </a:r>
+                <a:endParaRPr lang="en-US" dirty="0">
+                  <a:solidFill>
+                    <a:schemeClr val="tx1"/>
+                  </a:solidFill>
+                </a:endParaRPr>
+              </a:p>
+            </p:txBody>
+          </p:sp>
+          <p:sp>
+            <p:nvSpPr>
+              <p:cNvPr id="8" name="Oval 7">
+                <a:extLst>
+                  <a:ext uri="{FF2B5EF4-FFF2-40B4-BE49-F238E27FC236}">
+                    <a16:creationId xmlns:a16="http://schemas.microsoft.com/office/drawing/2014/main" id="{55DDCF50-6976-A344-A662-9EC49370921D}"/>
+                  </a:ext>
+                </a:extLst>
+              </p:cNvPr>
+              <p:cNvSpPr/>
+              <p:nvPr/>
+            </p:nvSpPr>
+            <p:spPr>
+              <a:xfrm>
+                <a:off x="5320748" y="3429000"/>
+                <a:ext cx="775252" cy="775252"/>
+              </a:xfrm>
+              <a:prstGeom prst="ellipse">
+                <a:avLst/>
+              </a:prstGeom>
+              <a:solidFill>
+                <a:schemeClr val="accent1">
+                  <a:lumMod val="20000"/>
+                  <a:lumOff val="80000"/>
+                </a:schemeClr>
+              </a:solidFill>
+              <a:ln>
+                <a:solidFill>
+                  <a:schemeClr val="accent1">
+                    <a:lumMod val="60000"/>
+                    <a:lumOff val="40000"/>
+                  </a:schemeClr>
+                </a:solidFill>
+              </a:ln>
+            </p:spPr>
+            <p:style>
+              <a:lnRef idx="2">
+                <a:schemeClr val="accent1">
+                  <a:shade val="50000"/>
+                </a:schemeClr>
+              </a:lnRef>
+              <a:fillRef idx="1">
+                <a:schemeClr val="accent1"/>
+              </a:fillRef>
+              <a:effectRef idx="0">
+                <a:schemeClr val="accent1"/>
+              </a:effectRef>
+              <a:fontRef idx="minor">
+                <a:schemeClr val="lt1"/>
+              </a:fontRef>
+            </p:style>
+            <p:txBody>
+              <a:bodyPr rtlCol="0" anchor="ctr"/>
+              <a:lstStyle/>
+              <a:p>
+                <a:pPr algn="ctr"/>
+                <a:r>
+                  <a:rPr lang="en-US" dirty="0">
+                    <a:solidFill>
+                      <a:schemeClr val="tx1"/>
+                    </a:solidFill>
+                  </a:rPr>
+                  <a:t>X</a:t>
+                </a:r>
+                <a:r>
+                  <a:rPr lang="en-US" baseline="-25000" dirty="0">
+                    <a:solidFill>
+                      <a:schemeClr val="tx1"/>
+                    </a:solidFill>
+                  </a:rPr>
+                  <a:t>3</a:t>
+                </a:r>
+                <a:endParaRPr lang="en-US" dirty="0">
+                  <a:solidFill>
+                    <a:schemeClr val="tx1"/>
+                  </a:solidFill>
+                </a:endParaRPr>
+              </a:p>
+            </p:txBody>
+          </p:sp>
+          <p:sp>
+            <p:nvSpPr>
+              <p:cNvPr id="9" name="Oval 8">
+                <a:extLst>
+                  <a:ext uri="{FF2B5EF4-FFF2-40B4-BE49-F238E27FC236}">
+                    <a16:creationId xmlns:a16="http://schemas.microsoft.com/office/drawing/2014/main" id="{1762BFB0-23EB-0243-A319-6B2223239312}"/>
+                  </a:ext>
+                </a:extLst>
+              </p:cNvPr>
+              <p:cNvSpPr/>
+              <p:nvPr/>
+            </p:nvSpPr>
+            <p:spPr>
+              <a:xfrm>
+                <a:off x="7103165" y="3429000"/>
+                <a:ext cx="775252" cy="775252"/>
+              </a:xfrm>
+              <a:prstGeom prst="ellipse">
+                <a:avLst/>
+              </a:prstGeom>
+              <a:solidFill>
+                <a:schemeClr val="accent1">
+                  <a:lumMod val="20000"/>
+                  <a:lumOff val="80000"/>
+                </a:schemeClr>
+              </a:solidFill>
+              <a:ln>
+                <a:solidFill>
+                  <a:schemeClr val="accent1">
+                    <a:lumMod val="60000"/>
+                    <a:lumOff val="40000"/>
+                  </a:schemeClr>
+                </a:solidFill>
+              </a:ln>
+            </p:spPr>
+            <p:style>
+              <a:lnRef idx="2">
+                <a:schemeClr val="accent1">
+                  <a:shade val="50000"/>
+                </a:schemeClr>
+              </a:lnRef>
+              <a:fillRef idx="1">
+                <a:schemeClr val="accent1"/>
+              </a:fillRef>
+              <a:effectRef idx="0">
+                <a:schemeClr val="accent1"/>
+              </a:effectRef>
+              <a:fontRef idx="minor">
+                <a:schemeClr val="lt1"/>
+              </a:fontRef>
+            </p:style>
+            <p:txBody>
+              <a:bodyPr rtlCol="0" anchor="ctr"/>
+              <a:lstStyle/>
+              <a:p>
+                <a:pPr algn="ctr"/>
+                <a:r>
+                  <a:rPr lang="en-US" dirty="0">
+                    <a:solidFill>
+                      <a:schemeClr val="tx1"/>
+                    </a:solidFill>
+                  </a:rPr>
+                  <a:t>X</a:t>
+                </a:r>
+                <a:r>
+                  <a:rPr lang="en-US" baseline="-25000" dirty="0">
+                    <a:solidFill>
+                      <a:schemeClr val="tx1"/>
+                    </a:solidFill>
+                  </a:rPr>
+                  <a:t>4</a:t>
+                </a:r>
+                <a:endParaRPr lang="en-US" dirty="0">
+                  <a:solidFill>
+                    <a:schemeClr val="tx1"/>
+                  </a:solidFill>
+                </a:endParaRPr>
+              </a:p>
+            </p:txBody>
+          </p:sp>
+          <p:sp>
+            <p:nvSpPr>
+              <p:cNvPr id="10" name="Oval 9">
+                <a:extLst>
+                  <a:ext uri="{FF2B5EF4-FFF2-40B4-BE49-F238E27FC236}">
+                    <a16:creationId xmlns:a16="http://schemas.microsoft.com/office/drawing/2014/main" id="{CBC8A930-76D8-7846-8F75-05C9D79EDC09}"/>
+                  </a:ext>
+                </a:extLst>
+              </p:cNvPr>
+              <p:cNvSpPr/>
+              <p:nvPr/>
+            </p:nvSpPr>
+            <p:spPr>
+              <a:xfrm>
+                <a:off x="5320748" y="4810539"/>
+                <a:ext cx="775252" cy="775252"/>
+              </a:xfrm>
+              <a:prstGeom prst="ellipse">
+                <a:avLst/>
+              </a:prstGeom>
+              <a:solidFill>
+                <a:schemeClr val="accent1">
+                  <a:lumMod val="20000"/>
+                  <a:lumOff val="80000"/>
+                </a:schemeClr>
+              </a:solidFill>
+              <a:ln>
+                <a:solidFill>
+                  <a:schemeClr val="accent1">
+                    <a:lumMod val="60000"/>
+                    <a:lumOff val="40000"/>
+                  </a:schemeClr>
+                </a:solidFill>
+              </a:ln>
+            </p:spPr>
+            <p:style>
+              <a:lnRef idx="2">
+                <a:schemeClr val="accent1">
+                  <a:shade val="50000"/>
+                </a:schemeClr>
+              </a:lnRef>
+              <a:fillRef idx="1">
+                <a:schemeClr val="accent1"/>
+              </a:fillRef>
+              <a:effectRef idx="0">
+                <a:schemeClr val="accent1"/>
+              </a:effectRef>
+              <a:fontRef idx="minor">
+                <a:schemeClr val="lt1"/>
+              </a:fontRef>
+            </p:style>
+            <p:txBody>
+              <a:bodyPr rtlCol="0" anchor="ctr"/>
+              <a:lstStyle/>
+              <a:p>
+                <a:pPr algn="ctr"/>
+                <a:r>
+                  <a:rPr lang="en-US" dirty="0">
+                    <a:solidFill>
+                      <a:schemeClr val="tx1"/>
+                    </a:solidFill>
+                  </a:rPr>
+                  <a:t>X</a:t>
+                </a:r>
+                <a:r>
+                  <a:rPr lang="en-US" baseline="-25000" dirty="0">
+                    <a:solidFill>
+                      <a:schemeClr val="tx1"/>
+                    </a:solidFill>
+                  </a:rPr>
+                  <a:t>5</a:t>
+                </a:r>
+                <a:endParaRPr lang="en-US" dirty="0">
+                  <a:solidFill>
+                    <a:schemeClr val="tx1"/>
+                  </a:solidFill>
+                </a:endParaRPr>
+              </a:p>
+            </p:txBody>
+          </p:sp>
+          <p:cxnSp>
+            <p:nvCxnSpPr>
+              <p:cNvPr id="11" name="Straight Arrow Connector 10">
+                <a:extLst>
+                  <a:ext uri="{FF2B5EF4-FFF2-40B4-BE49-F238E27FC236}">
+                    <a16:creationId xmlns:a16="http://schemas.microsoft.com/office/drawing/2014/main" id="{E789DC11-8457-2C4D-8618-7222E7AFE849}"/>
+                  </a:ext>
+                </a:extLst>
+              </p:cNvPr>
+              <p:cNvCxnSpPr>
+                <a:cxnSpLocks/>
+                <a:endCxn id="6" idx="2"/>
+              </p:cNvCxnSpPr>
+              <p:nvPr/>
+            </p:nvCxnSpPr>
+            <p:spPr>
+              <a:xfrm>
+                <a:off x="4313583" y="2435087"/>
+                <a:ext cx="1007165" cy="0"/>
+              </a:xfrm>
+              <a:prstGeom prst="straightConnector1">
+                <a:avLst/>
+              </a:prstGeom>
+              <a:ln w="38100">
+                <a:tailEnd type="triangle"/>
+              </a:ln>
+            </p:spPr>
+            <p:style>
+              <a:lnRef idx="1">
+                <a:schemeClr val="dk1"/>
+              </a:lnRef>
+              <a:fillRef idx="0">
+                <a:schemeClr val="dk1"/>
+              </a:fillRef>
+              <a:effectRef idx="0">
+                <a:schemeClr val="dk1"/>
+              </a:effectRef>
+              <a:fontRef idx="minor">
+                <a:schemeClr val="tx1"/>
+              </a:fontRef>
+            </p:style>
+          </p:cxnSp>
+          <p:cxnSp>
+            <p:nvCxnSpPr>
+              <p:cNvPr id="12" name="Straight Arrow Connector 11">
+                <a:extLst>
+                  <a:ext uri="{FF2B5EF4-FFF2-40B4-BE49-F238E27FC236}">
+                    <a16:creationId xmlns:a16="http://schemas.microsoft.com/office/drawing/2014/main" id="{F0EFA83B-F5D4-4645-9A4E-961D9268D98E}"/>
+                  </a:ext>
+                </a:extLst>
+              </p:cNvPr>
+              <p:cNvCxnSpPr>
+                <a:cxnSpLocks/>
+              </p:cNvCxnSpPr>
+              <p:nvPr/>
+            </p:nvCxnSpPr>
+            <p:spPr>
+              <a:xfrm>
+                <a:off x="6096000" y="2435087"/>
+                <a:ext cx="1007165" cy="0"/>
+              </a:xfrm>
+              <a:prstGeom prst="straightConnector1">
+                <a:avLst/>
+              </a:prstGeom>
+              <a:ln w="38100">
+                <a:tailEnd type="triangle"/>
+              </a:ln>
+            </p:spPr>
+            <p:style>
+              <a:lnRef idx="1">
+                <a:schemeClr val="dk1"/>
+              </a:lnRef>
+              <a:fillRef idx="0">
+                <a:schemeClr val="dk1"/>
+              </a:fillRef>
+              <a:effectRef idx="0">
+                <a:schemeClr val="dk1"/>
+              </a:effectRef>
+              <a:fontRef idx="minor">
+                <a:schemeClr val="tx1"/>
+              </a:fontRef>
+            </p:style>
+          </p:cxnSp>
+          <p:cxnSp>
+            <p:nvCxnSpPr>
+              <p:cNvPr id="13" name="Straight Arrow Connector 12">
+                <a:extLst>
+                  <a:ext uri="{FF2B5EF4-FFF2-40B4-BE49-F238E27FC236}">
+                    <a16:creationId xmlns:a16="http://schemas.microsoft.com/office/drawing/2014/main" id="{61BFA6F6-0260-624C-A6C7-F622E52C5680}"/>
+                  </a:ext>
+                </a:extLst>
+              </p:cNvPr>
+              <p:cNvCxnSpPr>
+                <a:stCxn id="5" idx="4"/>
+                <a:endCxn id="10" idx="2"/>
+              </p:cNvCxnSpPr>
+              <p:nvPr/>
+            </p:nvCxnSpPr>
+            <p:spPr>
+              <a:xfrm>
+                <a:off x="3925957" y="2822713"/>
+                <a:ext cx="1394791" cy="2375452"/>
+              </a:xfrm>
+              <a:prstGeom prst="straightConnector1">
+                <a:avLst/>
+              </a:prstGeom>
+              <a:ln w="38100">
+                <a:tailEnd type="triangle"/>
+              </a:ln>
+            </p:spPr>
+            <p:style>
+              <a:lnRef idx="1">
+                <a:schemeClr val="dk1"/>
+              </a:lnRef>
+              <a:fillRef idx="0">
+                <a:schemeClr val="dk1"/>
+              </a:fillRef>
+              <a:effectRef idx="0">
+                <a:schemeClr val="dk1"/>
+              </a:effectRef>
+              <a:fontRef idx="minor">
+                <a:schemeClr val="tx1"/>
+              </a:fontRef>
+            </p:style>
+          </p:cxnSp>
+          <p:cxnSp>
+            <p:nvCxnSpPr>
+              <p:cNvPr id="14" name="Straight Arrow Connector 13">
+                <a:extLst>
+                  <a:ext uri="{FF2B5EF4-FFF2-40B4-BE49-F238E27FC236}">
+                    <a16:creationId xmlns:a16="http://schemas.microsoft.com/office/drawing/2014/main" id="{A28641FD-002A-9347-A56F-44EA8D81386C}"/>
+                  </a:ext>
+                </a:extLst>
+              </p:cNvPr>
+              <p:cNvCxnSpPr>
+                <a:stCxn id="8" idx="6"/>
+                <a:endCxn id="7" idx="3"/>
+              </p:cNvCxnSpPr>
+              <p:nvPr/>
+            </p:nvCxnSpPr>
+            <p:spPr>
+              <a:xfrm flipV="1">
+                <a:off x="6096000" y="2709180"/>
+                <a:ext cx="1120698" cy="1107446"/>
+              </a:xfrm>
+              <a:prstGeom prst="straightConnector1">
+                <a:avLst/>
+              </a:prstGeom>
+              <a:ln w="38100">
+                <a:tailEnd type="triangle"/>
+              </a:ln>
+            </p:spPr>
+            <p:style>
+              <a:lnRef idx="1">
+                <a:schemeClr val="dk1"/>
+              </a:lnRef>
+              <a:fillRef idx="0">
+                <a:schemeClr val="dk1"/>
+              </a:fillRef>
+              <a:effectRef idx="0">
+                <a:schemeClr val="dk1"/>
+              </a:effectRef>
+              <a:fontRef idx="minor">
+                <a:schemeClr val="tx1"/>
+              </a:fontRef>
+            </p:style>
+          </p:cxnSp>
+          <p:cxnSp>
+            <p:nvCxnSpPr>
+              <p:cNvPr id="15" name="Straight Arrow Connector 14">
+                <a:extLst>
+                  <a:ext uri="{FF2B5EF4-FFF2-40B4-BE49-F238E27FC236}">
+                    <a16:creationId xmlns:a16="http://schemas.microsoft.com/office/drawing/2014/main" id="{61E194AD-5BE0-F544-B3C6-1533DB979694}"/>
+                  </a:ext>
+                </a:extLst>
+              </p:cNvPr>
+              <p:cNvCxnSpPr>
+                <a:stCxn id="10" idx="6"/>
+                <a:endCxn id="9" idx="3"/>
+              </p:cNvCxnSpPr>
+              <p:nvPr/>
+            </p:nvCxnSpPr>
+            <p:spPr>
+              <a:xfrm flipV="1">
+                <a:off x="6096000" y="4090719"/>
+                <a:ext cx="1120698" cy="1107446"/>
+              </a:xfrm>
+              <a:prstGeom prst="straightConnector1">
+                <a:avLst/>
+              </a:prstGeom>
+              <a:ln w="38100">
+                <a:tailEnd type="triangle"/>
+              </a:ln>
+            </p:spPr>
+            <p:style>
+              <a:lnRef idx="1">
+                <a:schemeClr val="dk1"/>
+              </a:lnRef>
+              <a:fillRef idx="0">
+                <a:schemeClr val="dk1"/>
+              </a:fillRef>
+              <a:effectRef idx="0">
+                <a:schemeClr val="dk1"/>
+              </a:effectRef>
+              <a:fontRef idx="minor">
+                <a:schemeClr val="tx1"/>
+              </a:fontRef>
+            </p:style>
+          </p:cxnSp>
+          <p:cxnSp>
+            <p:nvCxnSpPr>
+              <p:cNvPr id="16" name="Straight Arrow Connector 15">
+                <a:extLst>
+                  <a:ext uri="{FF2B5EF4-FFF2-40B4-BE49-F238E27FC236}">
+                    <a16:creationId xmlns:a16="http://schemas.microsoft.com/office/drawing/2014/main" id="{B248C0FD-54E4-5849-99F6-EFAD25E420D7}"/>
+                  </a:ext>
+                </a:extLst>
+              </p:cNvPr>
+              <p:cNvCxnSpPr>
+                <a:stCxn id="8" idx="6"/>
+                <a:endCxn id="9" idx="2"/>
+              </p:cNvCxnSpPr>
+              <p:nvPr/>
+            </p:nvCxnSpPr>
+            <p:spPr>
+              <a:xfrm>
+                <a:off x="6096000" y="3816626"/>
+                <a:ext cx="1007165" cy="0"/>
+              </a:xfrm>
+              <a:prstGeom prst="straightConnector1">
+                <a:avLst/>
+              </a:prstGeom>
+              <a:ln w="38100">
+                <a:tailEnd type="triangle"/>
+              </a:ln>
+            </p:spPr>
+            <p:style>
+              <a:lnRef idx="1">
+                <a:schemeClr val="dk1"/>
+              </a:lnRef>
+              <a:fillRef idx="0">
+                <a:schemeClr val="dk1"/>
+              </a:fillRef>
+              <a:effectRef idx="0">
+                <a:schemeClr val="dk1"/>
+              </a:effectRef>
+              <a:fontRef idx="minor">
+                <a:schemeClr val="tx1"/>
+              </a:fontRef>
+            </p:style>
+          </p:cxnSp>
+          <p:cxnSp>
+            <p:nvCxnSpPr>
+              <p:cNvPr id="17" name="Straight Arrow Connector 16">
+                <a:extLst>
+                  <a:ext uri="{FF2B5EF4-FFF2-40B4-BE49-F238E27FC236}">
+                    <a16:creationId xmlns:a16="http://schemas.microsoft.com/office/drawing/2014/main" id="{6A1ED663-56E0-2C4E-82B2-5B03FC9F2DA2}"/>
+                  </a:ext>
+                </a:extLst>
+              </p:cNvPr>
+              <p:cNvCxnSpPr>
+                <a:stCxn id="9" idx="0"/>
+                <a:endCxn id="7" idx="4"/>
+              </p:cNvCxnSpPr>
+              <p:nvPr/>
+            </p:nvCxnSpPr>
+            <p:spPr>
+              <a:xfrm flipV="1">
+                <a:off x="7490791" y="2822713"/>
+                <a:ext cx="0" cy="606287"/>
+              </a:xfrm>
+              <a:prstGeom prst="straightConnector1">
+                <a:avLst/>
+              </a:prstGeom>
+              <a:ln w="38100">
+                <a:tailEnd type="triangle"/>
+              </a:ln>
+            </p:spPr>
+            <p:style>
+              <a:lnRef idx="1">
+                <a:schemeClr val="dk1"/>
+              </a:lnRef>
+              <a:fillRef idx="0">
+                <a:schemeClr val="dk1"/>
+              </a:fillRef>
+              <a:effectRef idx="0">
+                <a:schemeClr val="dk1"/>
+              </a:effectRef>
+              <a:fontRef idx="minor">
+                <a:schemeClr val="tx1"/>
+              </a:fontRef>
+            </p:style>
+          </p:cxnSp>
+          <p:sp>
+            <p:nvSpPr>
+              <p:cNvPr id="18" name="TextBox 17">
+                <a:extLst>
+                  <a:ext uri="{FF2B5EF4-FFF2-40B4-BE49-F238E27FC236}">
+                    <a16:creationId xmlns:a16="http://schemas.microsoft.com/office/drawing/2014/main" id="{0B9E6AD5-91A2-B04C-AA57-24DA7D7D99B9}"/>
+                  </a:ext>
+                </a:extLst>
+              </p:cNvPr>
+              <p:cNvSpPr txBox="1"/>
+              <p:nvPr/>
+            </p:nvSpPr>
+            <p:spPr>
+              <a:xfrm>
+                <a:off x="4364957" y="2010204"/>
+                <a:ext cx="904415" cy="369332"/>
+              </a:xfrm>
+              <a:prstGeom prst="rect">
+                <a:avLst/>
+              </a:prstGeom>
+              <a:noFill/>
+            </p:spPr>
+            <p:txBody>
+              <a:bodyPr wrap="none" rtlCol="0">
+                <a:spAutoFit/>
+              </a:bodyPr>
+              <a:lstStyle/>
+              <a:p>
+                <a:r>
+                  <a:rPr lang="en-US" dirty="0"/>
+                  <a:t>[10, 20]</a:t>
+                </a:r>
+              </a:p>
+            </p:txBody>
+          </p:sp>
+          <p:sp>
+            <p:nvSpPr>
+              <p:cNvPr id="19" name="TextBox 18">
+                <a:extLst>
+                  <a:ext uri="{FF2B5EF4-FFF2-40B4-BE49-F238E27FC236}">
+                    <a16:creationId xmlns:a16="http://schemas.microsoft.com/office/drawing/2014/main" id="{5FECA82F-0EED-E648-BBF6-0530636536F8}"/>
+                  </a:ext>
+                </a:extLst>
+              </p:cNvPr>
+              <p:cNvSpPr txBox="1"/>
+              <p:nvPr/>
+            </p:nvSpPr>
+            <p:spPr>
+              <a:xfrm>
+                <a:off x="6147375" y="2043472"/>
+                <a:ext cx="904415" cy="369332"/>
+              </a:xfrm>
+              <a:prstGeom prst="rect">
+                <a:avLst/>
+              </a:prstGeom>
+              <a:noFill/>
+            </p:spPr>
+            <p:txBody>
+              <a:bodyPr wrap="none" rtlCol="0">
+                <a:spAutoFit/>
+              </a:bodyPr>
+              <a:lstStyle/>
+              <a:p>
+                <a:r>
+                  <a:rPr lang="en-US" dirty="0"/>
+                  <a:t>[40, 50]</a:t>
+                </a:r>
+              </a:p>
+            </p:txBody>
+          </p:sp>
+          <p:sp>
+            <p:nvSpPr>
+              <p:cNvPr id="20" name="TextBox 19">
+                <a:extLst>
+                  <a:ext uri="{FF2B5EF4-FFF2-40B4-BE49-F238E27FC236}">
+                    <a16:creationId xmlns:a16="http://schemas.microsoft.com/office/drawing/2014/main" id="{ECEEC887-81C3-8D4F-BCE2-48B45EA089F4}"/>
+                  </a:ext>
+                </a:extLst>
+              </p:cNvPr>
+              <p:cNvSpPr txBox="1"/>
+              <p:nvPr/>
+            </p:nvSpPr>
+            <p:spPr>
+              <a:xfrm>
+                <a:off x="5821907" y="2893571"/>
+                <a:ext cx="904415" cy="369332"/>
+              </a:xfrm>
+              <a:prstGeom prst="rect">
+                <a:avLst/>
+              </a:prstGeom>
+              <a:noFill/>
+            </p:spPr>
+            <p:txBody>
+              <a:bodyPr wrap="none" rtlCol="0">
+                <a:spAutoFit/>
+              </a:bodyPr>
+              <a:lstStyle/>
+              <a:p>
+                <a:r>
+                  <a:rPr lang="en-US" dirty="0"/>
+                  <a:t>[10, 20]</a:t>
+                </a:r>
+              </a:p>
+            </p:txBody>
+          </p:sp>
+          <p:sp>
+            <p:nvSpPr>
+              <p:cNvPr id="21" name="TextBox 20">
+                <a:extLst>
+                  <a:ext uri="{FF2B5EF4-FFF2-40B4-BE49-F238E27FC236}">
+                    <a16:creationId xmlns:a16="http://schemas.microsoft.com/office/drawing/2014/main" id="{6FF84B1A-96B0-5D4E-9D87-2C431BC992BF}"/>
+                  </a:ext>
+                </a:extLst>
+              </p:cNvPr>
+              <p:cNvSpPr txBox="1"/>
+              <p:nvPr/>
+            </p:nvSpPr>
+            <p:spPr>
+              <a:xfrm>
+                <a:off x="7539742" y="2893571"/>
+                <a:ext cx="904415" cy="369332"/>
+              </a:xfrm>
+              <a:prstGeom prst="rect">
+                <a:avLst/>
+              </a:prstGeom>
+              <a:noFill/>
+            </p:spPr>
+            <p:txBody>
+              <a:bodyPr wrap="none" rtlCol="0">
+                <a:spAutoFit/>
+              </a:bodyPr>
+              <a:lstStyle/>
+              <a:p>
+                <a:r>
+                  <a:rPr lang="en-US" dirty="0"/>
+                  <a:t>[10, 20]</a:t>
+                </a:r>
+              </a:p>
+            </p:txBody>
+          </p:sp>
+          <p:sp>
+            <p:nvSpPr>
+              <p:cNvPr id="22" name="TextBox 21">
+                <a:extLst>
+                  <a:ext uri="{FF2B5EF4-FFF2-40B4-BE49-F238E27FC236}">
+                    <a16:creationId xmlns:a16="http://schemas.microsoft.com/office/drawing/2014/main" id="{E9203D7C-FB12-6A44-AB6C-90F85E2FCD7F}"/>
+                  </a:ext>
+                </a:extLst>
+              </p:cNvPr>
+              <p:cNvSpPr txBox="1"/>
+              <p:nvPr/>
+            </p:nvSpPr>
+            <p:spPr>
+              <a:xfrm>
+                <a:off x="6205884" y="3851048"/>
+                <a:ext cx="787395" cy="369332"/>
+              </a:xfrm>
+              <a:prstGeom prst="rect">
+                <a:avLst/>
+              </a:prstGeom>
+              <a:noFill/>
+            </p:spPr>
+            <p:txBody>
+              <a:bodyPr wrap="none" rtlCol="0">
+                <a:spAutoFit/>
+              </a:bodyPr>
+              <a:lstStyle/>
+              <a:p>
+                <a:r>
+                  <a:rPr lang="en-US" dirty="0"/>
+                  <a:t>[5, 10]</a:t>
+                </a:r>
+              </a:p>
+            </p:txBody>
+          </p:sp>
+          <p:sp>
+            <p:nvSpPr>
+              <p:cNvPr id="23" name="TextBox 22">
+                <a:extLst>
+                  <a:ext uri="{FF2B5EF4-FFF2-40B4-BE49-F238E27FC236}">
+                    <a16:creationId xmlns:a16="http://schemas.microsoft.com/office/drawing/2014/main" id="{3DFCE4F0-547F-D54B-99CA-7A1281B97286}"/>
+                  </a:ext>
+                </a:extLst>
+              </p:cNvPr>
+              <p:cNvSpPr txBox="1"/>
+              <p:nvPr/>
+            </p:nvSpPr>
+            <p:spPr>
+              <a:xfrm>
+                <a:off x="3718937" y="3906053"/>
+                <a:ext cx="904415" cy="369332"/>
+              </a:xfrm>
+              <a:prstGeom prst="rect">
+                <a:avLst/>
+              </a:prstGeom>
+              <a:noFill/>
+            </p:spPr>
+            <p:txBody>
+              <a:bodyPr wrap="none" rtlCol="0">
+                <a:spAutoFit/>
+              </a:bodyPr>
+              <a:lstStyle/>
+              <a:p>
+                <a:r>
+                  <a:rPr lang="en-US" dirty="0"/>
+                  <a:t>[30, 50]</a:t>
+                </a:r>
+              </a:p>
+            </p:txBody>
+          </p:sp>
+          <p:sp>
+            <p:nvSpPr>
+              <p:cNvPr id="24" name="TextBox 23">
+                <a:extLst>
+                  <a:ext uri="{FF2B5EF4-FFF2-40B4-BE49-F238E27FC236}">
+                    <a16:creationId xmlns:a16="http://schemas.microsoft.com/office/drawing/2014/main" id="{53CF48AE-8F33-0E47-B7E5-4986C80A58AE}"/>
+                  </a:ext>
+                </a:extLst>
+              </p:cNvPr>
+              <p:cNvSpPr txBox="1"/>
+              <p:nvPr/>
+            </p:nvSpPr>
+            <p:spPr>
+              <a:xfrm>
+                <a:off x="6656349" y="4625873"/>
+                <a:ext cx="904415" cy="369332"/>
+              </a:xfrm>
+              <a:prstGeom prst="rect">
+                <a:avLst/>
+              </a:prstGeom>
+              <a:noFill/>
+            </p:spPr>
+            <p:txBody>
+              <a:bodyPr wrap="none" rtlCol="0">
+                <a:spAutoFit/>
+              </a:bodyPr>
+              <a:lstStyle/>
+              <a:p>
+                <a:r>
+                  <a:rPr lang="en-US" dirty="0"/>
+                  <a:t>[20, 30]</a:t>
+                </a:r>
+              </a:p>
+            </p:txBody>
+          </p:sp>
+        </p:grpSp>
+        <p:sp>
+          <p:nvSpPr>
+            <p:cNvPr id="28" name="U-Turn Arrow 27">
+              <a:extLst>
+                <a:ext uri="{FF2B5EF4-FFF2-40B4-BE49-F238E27FC236}">
+                  <a16:creationId xmlns:a16="http://schemas.microsoft.com/office/drawing/2014/main" id="{D7CE4513-12EB-BE48-B432-F7708ABB276D}"/>
+                </a:ext>
+              </a:extLst>
+            </p:cNvPr>
+            <p:cNvSpPr/>
+            <p:nvPr/>
+          </p:nvSpPr>
+          <p:spPr>
+            <a:xfrm>
+              <a:off x="4109259" y="807027"/>
+              <a:ext cx="3634807" cy="775252"/>
+            </a:xfrm>
+            <a:prstGeom prst="uturnArrow">
+              <a:avLst>
+                <a:gd name="adj1" fmla="val 6854"/>
+                <a:gd name="adj2" fmla="val 6515"/>
+                <a:gd name="adj3" fmla="val 5592"/>
+                <a:gd name="adj4" fmla="val 43750"/>
+                <a:gd name="adj5" fmla="val 81469"/>
+              </a:avLst>
+            </a:prstGeom>
+            <a:solidFill>
+              <a:srgbClr val="FF0000"/>
+            </a:solidFill>
+            <a:ln>
+              <a:solidFill>
+                <a:srgbClr val="FF0000"/>
+              </a:solidFill>
+            </a:ln>
+          </p:spPr>
+          <p:style>
+            <a:lnRef idx="2">
+              <a:schemeClr val="accent1">
+                <a:shade val="50000"/>
+              </a:schemeClr>
+            </a:lnRef>
+            <a:fillRef idx="1">
+              <a:schemeClr val="accent1"/>
+            </a:fillRef>
+            <a:effectRef idx="0">
+              <a:schemeClr val="accent1"/>
+            </a:effectRef>
+            <a:fontRef idx="minor">
+              <a:schemeClr val="lt1"/>
+            </a:fontRef>
+          </p:style>
+          <p:txBody>
+            <a:bodyPr rtlCol="0" anchor="ctr"/>
+            <a:lstStyle/>
+            <a:p>
+              <a:pPr algn="ctr"/>
+              <a:endParaRPr lang="en-US">
+                <a:solidFill>
+                  <a:schemeClr val="tx1"/>
+                </a:solidFill>
+              </a:endParaRPr>
+            </a:p>
+          </p:txBody>
+        </p:sp>
+        <p:sp>
+          <p:nvSpPr>
+            <p:cNvPr id="29" name="U-Turn Arrow 28">
+              <a:extLst>
+                <a:ext uri="{FF2B5EF4-FFF2-40B4-BE49-F238E27FC236}">
+                  <a16:creationId xmlns:a16="http://schemas.microsoft.com/office/drawing/2014/main" id="{2265385A-C27B-4946-8866-855BD5AF0B86}"/>
+                </a:ext>
+              </a:extLst>
+            </p:cNvPr>
+            <p:cNvSpPr/>
+            <p:nvPr/>
+          </p:nvSpPr>
+          <p:spPr>
+            <a:xfrm flipV="1">
+              <a:off x="3729516" y="2431431"/>
+              <a:ext cx="4253657" cy="3221202"/>
+            </a:xfrm>
+            <a:prstGeom prst="uturnArrow">
+              <a:avLst>
+                <a:gd name="adj1" fmla="val 1176"/>
+                <a:gd name="adj2" fmla="val 2052"/>
+                <a:gd name="adj3" fmla="val 2514"/>
+                <a:gd name="adj4" fmla="val 7812"/>
+                <a:gd name="adj5" fmla="val 51761"/>
+              </a:avLst>
+            </a:prstGeom>
+            <a:solidFill>
+              <a:srgbClr val="FF0000"/>
+            </a:solidFill>
+            <a:ln>
+              <a:solidFill>
+                <a:srgbClr val="FF0000"/>
+              </a:solidFill>
+            </a:ln>
+          </p:spPr>
+          <p:style>
+            <a:lnRef idx="2">
+              <a:schemeClr val="accent1">
+                <a:shade val="50000"/>
+              </a:schemeClr>
+            </a:lnRef>
+            <a:fillRef idx="1">
+              <a:schemeClr val="accent1"/>
+            </a:fillRef>
+            <a:effectRef idx="0">
+              <a:schemeClr val="accent1"/>
+            </a:effectRef>
+            <a:fontRef idx="minor">
+              <a:schemeClr val="lt1"/>
+            </a:fontRef>
+          </p:style>
+          <p:txBody>
+            <a:bodyPr rtlCol="0" anchor="ctr"/>
+            <a:lstStyle/>
+            <a:p>
+              <a:pPr algn="ctr"/>
+              <a:endParaRPr lang="en-US">
+                <a:solidFill>
+                  <a:schemeClr val="tx1"/>
+                </a:solidFill>
+              </a:endParaRPr>
+            </a:p>
+          </p:txBody>
+        </p:sp>
+        <p:cxnSp>
+          <p:nvCxnSpPr>
+            <p:cNvPr id="31" name="Straight Arrow Connector 30">
+              <a:extLst>
+                <a:ext uri="{FF2B5EF4-FFF2-40B4-BE49-F238E27FC236}">
+                  <a16:creationId xmlns:a16="http://schemas.microsoft.com/office/drawing/2014/main" id="{8C692647-B982-9941-A9BD-4B011316CB66}"/>
+                </a:ext>
+              </a:extLst>
+            </p:cNvPr>
+            <p:cNvCxnSpPr/>
+            <p:nvPr/>
+          </p:nvCxnSpPr>
+          <p:spPr>
+            <a:xfrm>
+              <a:off x="4418339" y="2431431"/>
+              <a:ext cx="955789" cy="739281"/>
+            </a:xfrm>
+            <a:prstGeom prst="straightConnector1">
+              <a:avLst/>
+            </a:prstGeom>
+            <a:ln w="57150">
+              <a:solidFill>
+                <a:srgbClr val="FF0000"/>
+              </a:solidFill>
+              <a:tailEnd type="triangle"/>
+            </a:ln>
+          </p:spPr>
+          <p:style>
+            <a:lnRef idx="1">
+              <a:schemeClr val="accent1"/>
+            </a:lnRef>
+            <a:fillRef idx="0">
+              <a:schemeClr val="accent1"/>
+            </a:fillRef>
+            <a:effectRef idx="0">
+              <a:schemeClr val="accent1"/>
+            </a:effectRef>
+            <a:fontRef idx="minor">
+              <a:schemeClr val="tx1"/>
+            </a:fontRef>
+          </p:style>
+        </p:cxnSp>
+        <p:cxnSp>
+          <p:nvCxnSpPr>
+            <p:cNvPr id="33" name="Straight Arrow Connector 32">
+              <a:extLst>
+                <a:ext uri="{FF2B5EF4-FFF2-40B4-BE49-F238E27FC236}">
+                  <a16:creationId xmlns:a16="http://schemas.microsoft.com/office/drawing/2014/main" id="{9BE30089-82E5-7247-A168-31686D8E2558}"/>
+                </a:ext>
+              </a:extLst>
+            </p:cNvPr>
+            <p:cNvCxnSpPr/>
+            <p:nvPr/>
+          </p:nvCxnSpPr>
+          <p:spPr>
+            <a:xfrm>
+              <a:off x="5676405" y="2500823"/>
+              <a:ext cx="0" cy="535429"/>
+            </a:xfrm>
+            <a:prstGeom prst="straightConnector1">
+              <a:avLst/>
+            </a:prstGeom>
+            <a:ln w="57150">
+              <a:solidFill>
+                <a:srgbClr val="FF0000"/>
+              </a:solidFill>
+              <a:tailEnd type="triangle"/>
+            </a:ln>
+          </p:spPr>
+          <p:style>
+            <a:lnRef idx="1">
+              <a:schemeClr val="accent1"/>
+            </a:lnRef>
+            <a:fillRef idx="0">
+              <a:schemeClr val="accent1"/>
+            </a:fillRef>
+            <a:effectRef idx="0">
+              <a:schemeClr val="accent1"/>
+            </a:effectRef>
+            <a:fontRef idx="minor">
+              <a:schemeClr val="tx1"/>
+            </a:fontRef>
+          </p:style>
+        </p:cxnSp>
+        <p:cxnSp>
+          <p:nvCxnSpPr>
+            <p:cNvPr id="34" name="Straight Arrow Connector 33">
+              <a:extLst>
+                <a:ext uri="{FF2B5EF4-FFF2-40B4-BE49-F238E27FC236}">
+                  <a16:creationId xmlns:a16="http://schemas.microsoft.com/office/drawing/2014/main" id="{DB9BD2B5-00A8-6A4B-A521-239DA7BEC4A2}"/>
+                </a:ext>
+              </a:extLst>
+            </p:cNvPr>
+            <p:cNvCxnSpPr>
+              <a:cxnSpLocks/>
+            </p:cNvCxnSpPr>
+            <p:nvPr/>
+          </p:nvCxnSpPr>
+          <p:spPr>
+            <a:xfrm flipV="1">
+              <a:off x="5801410" y="3877294"/>
+              <a:ext cx="11720" cy="483436"/>
+            </a:xfrm>
+            <a:prstGeom prst="straightConnector1">
+              <a:avLst/>
+            </a:prstGeom>
+            <a:ln w="57150">
+              <a:solidFill>
+                <a:srgbClr val="FF0000"/>
+              </a:solidFill>
+              <a:tailEnd type="triangle"/>
+            </a:ln>
+          </p:spPr>
+          <p:style>
+            <a:lnRef idx="1">
+              <a:schemeClr val="accent1"/>
+            </a:lnRef>
+            <a:fillRef idx="0">
+              <a:schemeClr val="accent1"/>
+            </a:fillRef>
+            <a:effectRef idx="0">
+              <a:schemeClr val="accent1"/>
+            </a:effectRef>
+            <a:fontRef idx="minor">
+              <a:schemeClr val="tx1"/>
+            </a:fontRef>
+          </p:style>
+        </p:cxnSp>
+        <p:cxnSp>
+          <p:nvCxnSpPr>
+            <p:cNvPr id="37" name="Straight Arrow Connector 36">
+              <a:extLst>
+                <a:ext uri="{FF2B5EF4-FFF2-40B4-BE49-F238E27FC236}">
+                  <a16:creationId xmlns:a16="http://schemas.microsoft.com/office/drawing/2014/main" id="{FA0287C6-2588-CB44-9460-614DFAEEC90D}"/>
+                </a:ext>
+              </a:extLst>
+            </p:cNvPr>
+            <p:cNvCxnSpPr/>
+            <p:nvPr/>
+          </p:nvCxnSpPr>
+          <p:spPr>
+            <a:xfrm>
+              <a:off x="6197189" y="2398896"/>
+              <a:ext cx="955789" cy="739281"/>
+            </a:xfrm>
+            <a:prstGeom prst="straightConnector1">
+              <a:avLst/>
+            </a:prstGeom>
+            <a:ln w="57150">
+              <a:solidFill>
+                <a:srgbClr val="FF0000"/>
+              </a:solidFill>
+              <a:tailEnd type="triangle"/>
+            </a:ln>
+          </p:spPr>
+          <p:style>
+            <a:lnRef idx="1">
+              <a:schemeClr val="accent1"/>
+            </a:lnRef>
+            <a:fillRef idx="0">
+              <a:schemeClr val="accent1"/>
+            </a:fillRef>
+            <a:effectRef idx="0">
+              <a:schemeClr val="accent1"/>
+            </a:effectRef>
+            <a:fontRef idx="minor">
+              <a:schemeClr val="tx1"/>
+            </a:fontRef>
+          </p:style>
+        </p:cxnSp>
+        <p:sp>
+          <p:nvSpPr>
+            <p:cNvPr id="38" name="TextBox 37">
+              <a:extLst>
+                <a:ext uri="{FF2B5EF4-FFF2-40B4-BE49-F238E27FC236}">
+                  <a16:creationId xmlns:a16="http://schemas.microsoft.com/office/drawing/2014/main" id="{13DC69DC-C71B-6F48-81CF-D6976232662D}"/>
+                </a:ext>
+              </a:extLst>
+            </p:cNvPr>
+            <p:cNvSpPr txBox="1"/>
+            <p:nvPr/>
+          </p:nvSpPr>
+          <p:spPr>
+            <a:xfrm>
+              <a:off x="5425504" y="403761"/>
+              <a:ext cx="904415" cy="369332"/>
+            </a:xfrm>
+            <a:prstGeom prst="rect">
+              <a:avLst/>
+            </a:prstGeom>
+            <a:noFill/>
+          </p:spPr>
+          <p:txBody>
+            <a:bodyPr wrap="none" rtlCol="0">
+              <a:spAutoFit/>
+            </a:bodyPr>
+            <a:lstStyle/>
+            <a:p>
+              <a:r>
+                <a:rPr lang="en-US" dirty="0">
+                  <a:solidFill>
+                    <a:srgbClr val="FF0000"/>
+                  </a:solidFill>
+                </a:rPr>
+                <a:t>[60, 70]</a:t>
+              </a:r>
+            </a:p>
+          </p:txBody>
+        </p:sp>
+        <p:sp>
+          <p:nvSpPr>
+            <p:cNvPr id="39" name="TextBox 38">
+              <a:extLst>
+                <a:ext uri="{FF2B5EF4-FFF2-40B4-BE49-F238E27FC236}">
+                  <a16:creationId xmlns:a16="http://schemas.microsoft.com/office/drawing/2014/main" id="{95813AB3-49DF-4944-AE7E-52CD91BE54E8}"/>
+                </a:ext>
+              </a:extLst>
+            </p:cNvPr>
+            <p:cNvSpPr txBox="1"/>
+            <p:nvPr/>
+          </p:nvSpPr>
+          <p:spPr>
+            <a:xfrm>
+              <a:off x="5425504" y="5771110"/>
+              <a:ext cx="904415" cy="369332"/>
+            </a:xfrm>
+            <a:prstGeom prst="rect">
+              <a:avLst/>
+            </a:prstGeom>
+            <a:noFill/>
+          </p:spPr>
+          <p:txBody>
+            <a:bodyPr wrap="none" rtlCol="0">
+              <a:spAutoFit/>
+            </a:bodyPr>
+            <a:lstStyle/>
+            <a:p>
+              <a:r>
+                <a:rPr lang="en-US" dirty="0">
+                  <a:solidFill>
+                    <a:srgbClr val="FF0000"/>
+                  </a:solidFill>
+                </a:rPr>
+                <a:t>[50, 80]</a:t>
+              </a:r>
+            </a:p>
+          </p:txBody>
+        </p:sp>
+        <p:sp>
+          <p:nvSpPr>
+            <p:cNvPr id="40" name="TextBox 39">
+              <a:extLst>
+                <a:ext uri="{FF2B5EF4-FFF2-40B4-BE49-F238E27FC236}">
+                  <a16:creationId xmlns:a16="http://schemas.microsoft.com/office/drawing/2014/main" id="{21F108D2-6A25-464F-909D-177F0BFA363B}"/>
+                </a:ext>
+              </a:extLst>
+            </p:cNvPr>
+            <p:cNvSpPr txBox="1"/>
+            <p:nvPr/>
+          </p:nvSpPr>
+          <p:spPr>
+            <a:xfrm>
+              <a:off x="4544992" y="3156109"/>
+              <a:ext cx="904415" cy="369332"/>
+            </a:xfrm>
+            <a:prstGeom prst="rect">
+              <a:avLst/>
+            </a:prstGeom>
+            <a:noFill/>
+          </p:spPr>
+          <p:txBody>
+            <a:bodyPr wrap="none" rtlCol="0">
+              <a:spAutoFit/>
+            </a:bodyPr>
+            <a:lstStyle/>
+            <a:p>
+              <a:r>
+                <a:rPr lang="en-US" dirty="0">
+                  <a:solidFill>
+                    <a:srgbClr val="FF0000"/>
+                  </a:solidFill>
+                </a:rPr>
+                <a:t>[40, 60]</a:t>
+              </a:r>
+            </a:p>
+          </p:txBody>
+        </p:sp>
+        <p:sp>
+          <p:nvSpPr>
+            <p:cNvPr id="41" name="TextBox 40">
+              <a:extLst>
+                <a:ext uri="{FF2B5EF4-FFF2-40B4-BE49-F238E27FC236}">
+                  <a16:creationId xmlns:a16="http://schemas.microsoft.com/office/drawing/2014/main" id="{A78B21A9-E49B-8C49-ACDD-CEEFCD361DB5}"/>
+                </a:ext>
+              </a:extLst>
+            </p:cNvPr>
+            <p:cNvSpPr txBox="1"/>
+            <p:nvPr/>
+          </p:nvSpPr>
+          <p:spPr>
+            <a:xfrm>
+              <a:off x="4791615" y="2382346"/>
+              <a:ext cx="904415" cy="369332"/>
+            </a:xfrm>
+            <a:prstGeom prst="rect">
+              <a:avLst/>
+            </a:prstGeom>
+            <a:noFill/>
+          </p:spPr>
+          <p:txBody>
+            <a:bodyPr wrap="none" rtlCol="0">
+              <a:spAutoFit/>
+            </a:bodyPr>
+            <a:lstStyle/>
+            <a:p>
+              <a:r>
+                <a:rPr lang="en-US" dirty="0">
+                  <a:solidFill>
+                    <a:srgbClr val="FF0000"/>
+                  </a:solidFill>
+                </a:rPr>
+                <a:t>[30, 30]</a:t>
+              </a:r>
+            </a:p>
+          </p:txBody>
+        </p:sp>
+        <p:sp>
+          <p:nvSpPr>
+            <p:cNvPr id="42" name="TextBox 41">
+              <a:extLst>
+                <a:ext uri="{FF2B5EF4-FFF2-40B4-BE49-F238E27FC236}">
+                  <a16:creationId xmlns:a16="http://schemas.microsoft.com/office/drawing/2014/main" id="{B61BE37C-4651-8143-98D8-BEB8E174FF02}"/>
+                </a:ext>
+              </a:extLst>
+            </p:cNvPr>
+            <p:cNvSpPr txBox="1"/>
+            <p:nvPr/>
+          </p:nvSpPr>
+          <p:spPr>
+            <a:xfrm>
+              <a:off x="5858432" y="3935163"/>
+              <a:ext cx="904415" cy="369332"/>
+            </a:xfrm>
+            <a:prstGeom prst="rect">
+              <a:avLst/>
+            </a:prstGeom>
+            <a:noFill/>
+          </p:spPr>
+          <p:txBody>
+            <a:bodyPr wrap="none" rtlCol="0">
+              <a:spAutoFit/>
+            </a:bodyPr>
+            <a:lstStyle/>
+            <a:p>
+              <a:r>
+                <a:rPr lang="en-US" dirty="0">
+                  <a:solidFill>
+                    <a:srgbClr val="FF0000"/>
+                  </a:solidFill>
+                </a:rPr>
+                <a:t>[15, 20]</a:t>
+              </a:r>
+            </a:p>
+          </p:txBody>
+        </p:sp>
+        <p:sp>
+          <p:nvSpPr>
+            <p:cNvPr id="43" name="TextBox 42">
+              <a:extLst>
+                <a:ext uri="{FF2B5EF4-FFF2-40B4-BE49-F238E27FC236}">
+                  <a16:creationId xmlns:a16="http://schemas.microsoft.com/office/drawing/2014/main" id="{DE1606EF-5C38-F042-91FF-9C3EF3B02B2A}"/>
+                </a:ext>
+              </a:extLst>
+            </p:cNvPr>
+            <p:cNvSpPr txBox="1"/>
+            <p:nvPr/>
+          </p:nvSpPr>
+          <p:spPr>
+            <a:xfrm>
+              <a:off x="6295691" y="2141942"/>
+              <a:ext cx="904415" cy="369332"/>
+            </a:xfrm>
+            <a:prstGeom prst="rect">
+              <a:avLst/>
+            </a:prstGeom>
+            <a:noFill/>
+          </p:spPr>
+          <p:txBody>
+            <a:bodyPr wrap="none" rtlCol="0">
+              <a:spAutoFit/>
+            </a:bodyPr>
+            <a:lstStyle/>
+            <a:p>
+              <a:r>
+                <a:rPr lang="en-US" dirty="0">
+                  <a:solidFill>
+                    <a:srgbClr val="FF0000"/>
+                  </a:solidFill>
+                </a:rPr>
+                <a:t>[50, 60]</a:t>
+              </a:r>
+            </a:p>
+          </p:txBody>
+        </p:sp>
+      </p:grpSp>
+    </p:spTree>
+    <p:extLst>
+      <p:ext uri="{BB962C8B-B14F-4D97-AF65-F5344CB8AC3E}">
+        <p14:creationId xmlns:p14="http://schemas.microsoft.com/office/powerpoint/2010/main" val="1260411906"/>
+      </p:ext>
+    </p:extLst>
+  </p:cSld>
+  <p:clrMapOvr>
+    <a:masterClrMapping/>
+  </p:clrMapOvr>
+</p:sld>
+</file>
+
 <file path=ppt/theme/theme1.xml><?xml version="1.0" encoding="utf-8"?>
 <a:theme xmlns:a="http://schemas.openxmlformats.org/drawingml/2006/main" name="Office Theme">
   <a:themeElements>

</xml_diff>

<commit_message>
added star wars example
</commit_message>
<xml_diff>
--- a/images.pptx
+++ b/images.pptx
@@ -16,6 +16,8 @@
     <p:sldId id="264" r:id="rId10"/>
     <p:sldId id="265" r:id="rId11"/>
     <p:sldId id="266" r:id="rId12"/>
+    <p:sldId id="268" r:id="rId13"/>
+    <p:sldId id="269" r:id="rId14"/>
   </p:sldIdLst>
   <p:sldSz cx="12192000" cy="6858000"/>
   <p:notesSz cx="6858000" cy="9144000"/>
@@ -269,7 +271,7 @@
           <a:p>
             <a:fld id="{C9D7E1C7-362E-0A4F-BED6-EEFD53131585}" type="datetimeFigureOut">
               <a:rPr lang="en-US" smtClean="0"/>
-              <a:t>11/20/19</a:t>
+              <a:t>11/21/19</a:t>
             </a:fld>
             <a:endParaRPr lang="en-US"/>
           </a:p>
@@ -467,7 +469,7 @@
           <a:p>
             <a:fld id="{C9D7E1C7-362E-0A4F-BED6-EEFD53131585}" type="datetimeFigureOut">
               <a:rPr lang="en-US" smtClean="0"/>
-              <a:t>11/20/19</a:t>
+              <a:t>11/21/19</a:t>
             </a:fld>
             <a:endParaRPr lang="en-US"/>
           </a:p>
@@ -675,7 +677,7 @@
           <a:p>
             <a:fld id="{C9D7E1C7-362E-0A4F-BED6-EEFD53131585}" type="datetimeFigureOut">
               <a:rPr lang="en-US" smtClean="0"/>
-              <a:t>11/20/19</a:t>
+              <a:t>11/21/19</a:t>
             </a:fld>
             <a:endParaRPr lang="en-US"/>
           </a:p>
@@ -873,7 +875,7 @@
           <a:p>
             <a:fld id="{C9D7E1C7-362E-0A4F-BED6-EEFD53131585}" type="datetimeFigureOut">
               <a:rPr lang="en-US" smtClean="0"/>
-              <a:t>11/20/19</a:t>
+              <a:t>11/21/19</a:t>
             </a:fld>
             <a:endParaRPr lang="en-US"/>
           </a:p>
@@ -1148,7 +1150,7 @@
           <a:p>
             <a:fld id="{C9D7E1C7-362E-0A4F-BED6-EEFD53131585}" type="datetimeFigureOut">
               <a:rPr lang="en-US" smtClean="0"/>
-              <a:t>11/20/19</a:t>
+              <a:t>11/21/19</a:t>
             </a:fld>
             <a:endParaRPr lang="en-US"/>
           </a:p>
@@ -1413,7 +1415,7 @@
           <a:p>
             <a:fld id="{C9D7E1C7-362E-0A4F-BED6-EEFD53131585}" type="datetimeFigureOut">
               <a:rPr lang="en-US" smtClean="0"/>
-              <a:t>11/20/19</a:t>
+              <a:t>11/21/19</a:t>
             </a:fld>
             <a:endParaRPr lang="en-US"/>
           </a:p>
@@ -1825,7 +1827,7 @@
           <a:p>
             <a:fld id="{C9D7E1C7-362E-0A4F-BED6-EEFD53131585}" type="datetimeFigureOut">
               <a:rPr lang="en-US" smtClean="0"/>
-              <a:t>11/20/19</a:t>
+              <a:t>11/21/19</a:t>
             </a:fld>
             <a:endParaRPr lang="en-US"/>
           </a:p>
@@ -1966,7 +1968,7 @@
           <a:p>
             <a:fld id="{C9D7E1C7-362E-0A4F-BED6-EEFD53131585}" type="datetimeFigureOut">
               <a:rPr lang="en-US" smtClean="0"/>
-              <a:t>11/20/19</a:t>
+              <a:t>11/21/19</a:t>
             </a:fld>
             <a:endParaRPr lang="en-US"/>
           </a:p>
@@ -2079,7 +2081,7 @@
           <a:p>
             <a:fld id="{C9D7E1C7-362E-0A4F-BED6-EEFD53131585}" type="datetimeFigureOut">
               <a:rPr lang="en-US" smtClean="0"/>
-              <a:t>11/20/19</a:t>
+              <a:t>11/21/19</a:t>
             </a:fld>
             <a:endParaRPr lang="en-US"/>
           </a:p>
@@ -2390,7 +2392,7 @@
           <a:p>
             <a:fld id="{C9D7E1C7-362E-0A4F-BED6-EEFD53131585}" type="datetimeFigureOut">
               <a:rPr lang="en-US" smtClean="0"/>
-              <a:t>11/20/19</a:t>
+              <a:t>11/21/19</a:t>
             </a:fld>
             <a:endParaRPr lang="en-US"/>
           </a:p>
@@ -2678,7 +2680,7 @@
           <a:p>
             <a:fld id="{C9D7E1C7-362E-0A4F-BED6-EEFD53131585}" type="datetimeFigureOut">
               <a:rPr lang="en-US" smtClean="0"/>
-              <a:t>11/20/19</a:t>
+              <a:t>11/21/19</a:t>
             </a:fld>
             <a:endParaRPr lang="en-US"/>
           </a:p>
@@ -2919,7 +2921,7 @@
           <a:p>
             <a:fld id="{C9D7E1C7-362E-0A4F-BED6-EEFD53131585}" type="datetimeFigureOut">
               <a:rPr lang="en-US" smtClean="0"/>
-              <a:t>11/20/19</a:t>
+              <a:t>11/21/19</a:t>
             </a:fld>
             <a:endParaRPr lang="en-US"/>
           </a:p>
@@ -8168,6 +8170,146 @@
     <p:extLst>
       <p:ext uri="{BB962C8B-B14F-4D97-AF65-F5344CB8AC3E}">
         <p14:creationId xmlns:p14="http://schemas.microsoft.com/office/powerpoint/2010/main" val="498838808"/>
+      </p:ext>
+    </p:extLst>
+  </p:cSld>
+  <p:clrMapOvr>
+    <a:masterClrMapping/>
+  </p:clrMapOvr>
+</p:sld>
+</file>
+
+<file path=ppt/slides/slide12.xml><?xml version="1.0" encoding="utf-8"?>
+<p:sld xmlns:a="http://schemas.openxmlformats.org/drawingml/2006/main" xmlns:r="http://schemas.openxmlformats.org/officeDocument/2006/relationships" xmlns:p="http://schemas.openxmlformats.org/presentationml/2006/main">
+  <p:cSld>
+    <p:spTree>
+      <p:nvGrpSpPr>
+        <p:cNvPr id="1" name=""/>
+        <p:cNvGrpSpPr/>
+        <p:nvPr/>
+      </p:nvGrpSpPr>
+      <p:grpSpPr>
+        <a:xfrm>
+          <a:off x="0" y="0"/>
+          <a:ext cx="0" cy="0"/>
+          <a:chOff x="0" y="0"/>
+          <a:chExt cx="0" cy="0"/>
+        </a:xfrm>
+      </p:grpSpPr>
+      <p:pic>
+        <p:nvPicPr>
+          <p:cNvPr id="4" name="Picture 3">
+            <a:extLst>
+              <a:ext uri="{FF2B5EF4-FFF2-40B4-BE49-F238E27FC236}">
+                <a16:creationId xmlns:a16="http://schemas.microsoft.com/office/drawing/2014/main" id="{F33D9F11-BD37-234D-B105-8AD2E3DF2CDE}"/>
+              </a:ext>
+            </a:extLst>
+          </p:cNvPr>
+          <p:cNvPicPr>
+            <a:picLocks noChangeAspect="1"/>
+          </p:cNvPicPr>
+          <p:nvPr/>
+        </p:nvPicPr>
+        <p:blipFill>
+          <a:blip r:embed="rId2"/>
+          <a:stretch>
+            <a:fillRect/>
+          </a:stretch>
+        </p:blipFill>
+        <p:spPr>
+          <a:xfrm>
+            <a:off x="3105150" y="2000250"/>
+            <a:ext cx="5981700" cy="2857500"/>
+          </a:xfrm>
+          <a:prstGeom prst="rect">
+            <a:avLst/>
+          </a:prstGeom>
+        </p:spPr>
+      </p:pic>
+    </p:spTree>
+    <p:extLst>
+      <p:ext uri="{BB962C8B-B14F-4D97-AF65-F5344CB8AC3E}">
+        <p14:creationId xmlns:p14="http://schemas.microsoft.com/office/powerpoint/2010/main" val="422412838"/>
+      </p:ext>
+    </p:extLst>
+  </p:cSld>
+  <p:clrMapOvr>
+    <a:masterClrMapping/>
+  </p:clrMapOvr>
+</p:sld>
+</file>
+
+<file path=ppt/slides/slide13.xml><?xml version="1.0" encoding="utf-8"?>
+<p:sld xmlns:a="http://schemas.openxmlformats.org/drawingml/2006/main" xmlns:r="http://schemas.openxmlformats.org/officeDocument/2006/relationships" xmlns:p="http://schemas.openxmlformats.org/presentationml/2006/main">
+  <p:cSld>
+    <p:spTree>
+      <p:nvGrpSpPr>
+        <p:cNvPr id="1" name=""/>
+        <p:cNvGrpSpPr/>
+        <p:nvPr/>
+      </p:nvGrpSpPr>
+      <p:grpSpPr>
+        <a:xfrm>
+          <a:off x="0" y="0"/>
+          <a:ext cx="0" cy="0"/>
+          <a:chOff x="0" y="0"/>
+          <a:chExt cx="0" cy="0"/>
+        </a:xfrm>
+      </p:grpSpPr>
+      <p:sp>
+        <p:nvSpPr>
+          <p:cNvPr id="2" name="Title 1">
+            <a:extLst>
+              <a:ext uri="{FF2B5EF4-FFF2-40B4-BE49-F238E27FC236}">
+                <a16:creationId xmlns:a16="http://schemas.microsoft.com/office/drawing/2014/main" id="{93300525-B983-474D-97F4-B62A6A90CE64}"/>
+              </a:ext>
+            </a:extLst>
+          </p:cNvPr>
+          <p:cNvSpPr>
+            <a:spLocks noGrp="1"/>
+          </p:cNvSpPr>
+          <p:nvPr>
+            <p:ph type="title"/>
+          </p:nvPr>
+        </p:nvSpPr>
+        <p:spPr/>
+        <p:txBody>
+          <a:bodyPr/>
+          <a:lstStyle/>
+          <a:p>
+            <a:endParaRPr lang="en-US"/>
+          </a:p>
+        </p:txBody>
+      </p:sp>
+      <p:sp>
+        <p:nvSpPr>
+          <p:cNvPr id="3" name="Content Placeholder 2">
+            <a:extLst>
+              <a:ext uri="{FF2B5EF4-FFF2-40B4-BE49-F238E27FC236}">
+                <a16:creationId xmlns:a16="http://schemas.microsoft.com/office/drawing/2014/main" id="{8612DCD4-F10A-CB4C-A573-04D8560D7F57}"/>
+              </a:ext>
+            </a:extLst>
+          </p:cNvPr>
+          <p:cNvSpPr>
+            <a:spLocks noGrp="1"/>
+          </p:cNvSpPr>
+          <p:nvPr>
+            <p:ph idx="1"/>
+          </p:nvPr>
+        </p:nvSpPr>
+        <p:spPr/>
+        <p:txBody>
+          <a:bodyPr/>
+          <a:lstStyle/>
+          <a:p>
+            <a:endParaRPr lang="en-US"/>
+          </a:p>
+        </p:txBody>
+      </p:sp>
+    </p:spTree>
+    <p:extLst>
+      <p:ext uri="{BB962C8B-B14F-4D97-AF65-F5344CB8AC3E}">
+        <p14:creationId xmlns:p14="http://schemas.microsoft.com/office/powerpoint/2010/main" val="2625973515"/>
       </p:ext>
     </p:extLst>
   </p:cSld>

</xml_diff>